<commit_message>
Added Slides to pptx file
added some slides to the pptx file
</commit_message>
<xml_diff>
--- a/group5_graphtheory.pptx
+++ b/group5_graphtheory.pptx
@@ -5,7 +5,7 @@
     <p:sldMasterId id="2147483648" r:id="rId1"/>
   </p:sldMasterIdLst>
   <p:notesMasterIdLst>
-    <p:notesMasterId r:id="rId16"/>
+    <p:notesMasterId r:id="rId21"/>
   </p:notesMasterIdLst>
   <p:sldIdLst>
     <p:sldId id="257" r:id="rId2"/>
@@ -22,6 +22,11 @@
     <p:sldId id="258" r:id="rId13"/>
     <p:sldId id="267" r:id="rId14"/>
     <p:sldId id="270" r:id="rId15"/>
+    <p:sldId id="271" r:id="rId16"/>
+    <p:sldId id="272" r:id="rId17"/>
+    <p:sldId id="273" r:id="rId18"/>
+    <p:sldId id="274" r:id="rId19"/>
+    <p:sldId id="275" r:id="rId20"/>
   </p:sldIdLst>
   <p:sldSz cx="12192000" cy="6858000"/>
   <p:notesSz cx="6858000" cy="9144000"/>
@@ -122,7 +127,7 @@
   </p:defaultTextStyle>
   <p:extLst>
     <p:ext uri="{EFAFB233-063F-42B5-8137-9DF3F51BA10A}">
-      <p15:sldGuideLst xmlns:p15="http://schemas.microsoft.com/office/powerpoint/2012/main"/>
+      <p15:sldGuideLst xmlns:p15="http://schemas.microsoft.com/office/powerpoint/2012/main" xmlns=""/>
     </p:ext>
   </p:extLst>
 </p:presentation>
@@ -210,7 +215,7 @@
           <a:p>
             <a:fld id="{1ACB21A0-39B6-47AA-9E9C-8EBA43CBC444}" type="datetimeFigureOut">
               <a:rPr lang="en-US" smtClean="0"/>
-              <a:t>11/3/2024</a:t>
+              <a:t>11/9/2024</a:t>
             </a:fld>
             <a:endParaRPr lang="en-US"/>
           </a:p>
@@ -499,7 +504,7 @@
           <p:cNvPr id="2" name="Title 1">
             <a:extLst>
               <a:ext uri="{FF2B5EF4-FFF2-40B4-BE49-F238E27FC236}">
-                <a16:creationId xmlns:a16="http://schemas.microsoft.com/office/drawing/2014/main" id="{BBCE1907-BF49-D1B3-738F-3128D585CAE0}"/>
+                <a16:creationId xmlns:a16="http://schemas.microsoft.com/office/drawing/2014/main" xmlns="" id="{BBCE1907-BF49-D1B3-738F-3128D585CAE0}"/>
               </a:ext>
             </a:extLst>
           </p:cNvPr>
@@ -536,7 +541,7 @@
           <p:cNvPr id="3" name="Subtitle 2">
             <a:extLst>
               <a:ext uri="{FF2B5EF4-FFF2-40B4-BE49-F238E27FC236}">
-                <a16:creationId xmlns:a16="http://schemas.microsoft.com/office/drawing/2014/main" id="{19BC5ED9-2757-F5C3-CD09-15EB86E41325}"/>
+                <a16:creationId xmlns:a16="http://schemas.microsoft.com/office/drawing/2014/main" xmlns="" id="{19BC5ED9-2757-F5C3-CD09-15EB86E41325}"/>
               </a:ext>
             </a:extLst>
           </p:cNvPr>
@@ -606,7 +611,7 @@
           <p:cNvPr id="4" name="Date Placeholder 3">
             <a:extLst>
               <a:ext uri="{FF2B5EF4-FFF2-40B4-BE49-F238E27FC236}">
-                <a16:creationId xmlns:a16="http://schemas.microsoft.com/office/drawing/2014/main" id="{05358264-F8B0-A276-EFD2-30AB32E7D94D}"/>
+                <a16:creationId xmlns:a16="http://schemas.microsoft.com/office/drawing/2014/main" xmlns="" id="{05358264-F8B0-A276-EFD2-30AB32E7D94D}"/>
               </a:ext>
             </a:extLst>
           </p:cNvPr>
@@ -624,7 +629,7 @@
           <a:p>
             <a:fld id="{98235D44-F49E-4F77-A348-B0CDA85E7A83}" type="datetimeFigureOut">
               <a:rPr lang="en-US" smtClean="0"/>
-              <a:t>11/3/2024</a:t>
+              <a:t>11/9/2024</a:t>
             </a:fld>
             <a:endParaRPr lang="en-US"/>
           </a:p>
@@ -635,7 +640,7 @@
           <p:cNvPr id="5" name="Footer Placeholder 4">
             <a:extLst>
               <a:ext uri="{FF2B5EF4-FFF2-40B4-BE49-F238E27FC236}">
-                <a16:creationId xmlns:a16="http://schemas.microsoft.com/office/drawing/2014/main" id="{90EE5563-C195-4274-9EC3-F64606ED5028}"/>
+                <a16:creationId xmlns:a16="http://schemas.microsoft.com/office/drawing/2014/main" xmlns="" id="{90EE5563-C195-4274-9EC3-F64606ED5028}"/>
               </a:ext>
             </a:extLst>
           </p:cNvPr>
@@ -660,7 +665,7 @@
           <p:cNvPr id="6" name="Slide Number Placeholder 5">
             <a:extLst>
               <a:ext uri="{FF2B5EF4-FFF2-40B4-BE49-F238E27FC236}">
-                <a16:creationId xmlns:a16="http://schemas.microsoft.com/office/drawing/2014/main" id="{F4099638-DF8D-621F-D9A4-D6A107E6D17D}"/>
+                <a16:creationId xmlns:a16="http://schemas.microsoft.com/office/drawing/2014/main" xmlns="" id="{F4099638-DF8D-621F-D9A4-D6A107E6D17D}"/>
               </a:ext>
             </a:extLst>
           </p:cNvPr>
@@ -719,7 +724,7 @@
           <p:cNvPr id="2" name="Title 1">
             <a:extLst>
               <a:ext uri="{FF2B5EF4-FFF2-40B4-BE49-F238E27FC236}">
-                <a16:creationId xmlns:a16="http://schemas.microsoft.com/office/drawing/2014/main" id="{ADFC1F59-0CFE-78AB-46EC-BCE01ADA4D41}"/>
+                <a16:creationId xmlns:a16="http://schemas.microsoft.com/office/drawing/2014/main" xmlns="" id="{ADFC1F59-0CFE-78AB-46EC-BCE01ADA4D41}"/>
               </a:ext>
             </a:extLst>
           </p:cNvPr>
@@ -747,7 +752,7 @@
           <p:cNvPr id="3" name="Vertical Text Placeholder 2">
             <a:extLst>
               <a:ext uri="{FF2B5EF4-FFF2-40B4-BE49-F238E27FC236}">
-                <a16:creationId xmlns:a16="http://schemas.microsoft.com/office/drawing/2014/main" id="{E67E3BB0-EA82-7DF3-C844-C08581E515F5}"/>
+                <a16:creationId xmlns:a16="http://schemas.microsoft.com/office/drawing/2014/main" xmlns="" id="{E67E3BB0-EA82-7DF3-C844-C08581E515F5}"/>
               </a:ext>
             </a:extLst>
           </p:cNvPr>
@@ -804,7 +809,7 @@
           <p:cNvPr id="4" name="Date Placeholder 3">
             <a:extLst>
               <a:ext uri="{FF2B5EF4-FFF2-40B4-BE49-F238E27FC236}">
-                <a16:creationId xmlns:a16="http://schemas.microsoft.com/office/drawing/2014/main" id="{397E52DF-A3DD-73BC-352D-108DA5F729C0}"/>
+                <a16:creationId xmlns:a16="http://schemas.microsoft.com/office/drawing/2014/main" xmlns="" id="{397E52DF-A3DD-73BC-352D-108DA5F729C0}"/>
               </a:ext>
             </a:extLst>
           </p:cNvPr>
@@ -822,7 +827,7 @@
           <a:p>
             <a:fld id="{98235D44-F49E-4F77-A348-B0CDA85E7A83}" type="datetimeFigureOut">
               <a:rPr lang="en-US" smtClean="0"/>
-              <a:t>11/3/2024</a:t>
+              <a:t>11/9/2024</a:t>
             </a:fld>
             <a:endParaRPr lang="en-US"/>
           </a:p>
@@ -833,7 +838,7 @@
           <p:cNvPr id="5" name="Footer Placeholder 4">
             <a:extLst>
               <a:ext uri="{FF2B5EF4-FFF2-40B4-BE49-F238E27FC236}">
-                <a16:creationId xmlns:a16="http://schemas.microsoft.com/office/drawing/2014/main" id="{EADBC1C7-87F5-254B-E446-5AD25DA0392E}"/>
+                <a16:creationId xmlns:a16="http://schemas.microsoft.com/office/drawing/2014/main" xmlns="" id="{EADBC1C7-87F5-254B-E446-5AD25DA0392E}"/>
               </a:ext>
             </a:extLst>
           </p:cNvPr>
@@ -858,7 +863,7 @@
           <p:cNvPr id="6" name="Slide Number Placeholder 5">
             <a:extLst>
               <a:ext uri="{FF2B5EF4-FFF2-40B4-BE49-F238E27FC236}">
-                <a16:creationId xmlns:a16="http://schemas.microsoft.com/office/drawing/2014/main" id="{C152FEE2-1BD3-A4D0-0D35-E7305E78860E}"/>
+                <a16:creationId xmlns:a16="http://schemas.microsoft.com/office/drawing/2014/main" xmlns="" id="{C152FEE2-1BD3-A4D0-0D35-E7305E78860E}"/>
               </a:ext>
             </a:extLst>
           </p:cNvPr>
@@ -917,7 +922,7 @@
           <p:cNvPr id="2" name="Vertical Title 1">
             <a:extLst>
               <a:ext uri="{FF2B5EF4-FFF2-40B4-BE49-F238E27FC236}">
-                <a16:creationId xmlns:a16="http://schemas.microsoft.com/office/drawing/2014/main" id="{481586F5-F921-B763-3950-D7872EE73133}"/>
+                <a16:creationId xmlns:a16="http://schemas.microsoft.com/office/drawing/2014/main" xmlns="" id="{481586F5-F921-B763-3950-D7872EE73133}"/>
               </a:ext>
             </a:extLst>
           </p:cNvPr>
@@ -950,7 +955,7 @@
           <p:cNvPr id="3" name="Vertical Text Placeholder 2">
             <a:extLst>
               <a:ext uri="{FF2B5EF4-FFF2-40B4-BE49-F238E27FC236}">
-                <a16:creationId xmlns:a16="http://schemas.microsoft.com/office/drawing/2014/main" id="{3EEE1185-E9A2-AC83-C12D-85B8AAFE2D09}"/>
+                <a16:creationId xmlns:a16="http://schemas.microsoft.com/office/drawing/2014/main" xmlns="" id="{3EEE1185-E9A2-AC83-C12D-85B8AAFE2D09}"/>
               </a:ext>
             </a:extLst>
           </p:cNvPr>
@@ -1012,7 +1017,7 @@
           <p:cNvPr id="4" name="Date Placeholder 3">
             <a:extLst>
               <a:ext uri="{FF2B5EF4-FFF2-40B4-BE49-F238E27FC236}">
-                <a16:creationId xmlns:a16="http://schemas.microsoft.com/office/drawing/2014/main" id="{19B0B450-44E0-65BA-46AD-192A2EAF8A93}"/>
+                <a16:creationId xmlns:a16="http://schemas.microsoft.com/office/drawing/2014/main" xmlns="" id="{19B0B450-44E0-65BA-46AD-192A2EAF8A93}"/>
               </a:ext>
             </a:extLst>
           </p:cNvPr>
@@ -1030,7 +1035,7 @@
           <a:p>
             <a:fld id="{98235D44-F49E-4F77-A348-B0CDA85E7A83}" type="datetimeFigureOut">
               <a:rPr lang="en-US" smtClean="0"/>
-              <a:t>11/3/2024</a:t>
+              <a:t>11/9/2024</a:t>
             </a:fld>
             <a:endParaRPr lang="en-US"/>
           </a:p>
@@ -1041,7 +1046,7 @@
           <p:cNvPr id="5" name="Footer Placeholder 4">
             <a:extLst>
               <a:ext uri="{FF2B5EF4-FFF2-40B4-BE49-F238E27FC236}">
-                <a16:creationId xmlns:a16="http://schemas.microsoft.com/office/drawing/2014/main" id="{CA3D37D5-2E14-DE41-F72B-817ED02D2C96}"/>
+                <a16:creationId xmlns:a16="http://schemas.microsoft.com/office/drawing/2014/main" xmlns="" id="{CA3D37D5-2E14-DE41-F72B-817ED02D2C96}"/>
               </a:ext>
             </a:extLst>
           </p:cNvPr>
@@ -1066,7 +1071,7 @@
           <p:cNvPr id="6" name="Slide Number Placeholder 5">
             <a:extLst>
               <a:ext uri="{FF2B5EF4-FFF2-40B4-BE49-F238E27FC236}">
-                <a16:creationId xmlns:a16="http://schemas.microsoft.com/office/drawing/2014/main" id="{E37FEEDB-FAA5-ACE2-C695-76BB6061883B}"/>
+                <a16:creationId xmlns:a16="http://schemas.microsoft.com/office/drawing/2014/main" xmlns="" id="{E37FEEDB-FAA5-ACE2-C695-76BB6061883B}"/>
               </a:ext>
             </a:extLst>
           </p:cNvPr>
@@ -1125,7 +1130,7 @@
           <p:cNvPr id="2" name="Title 1">
             <a:extLst>
               <a:ext uri="{FF2B5EF4-FFF2-40B4-BE49-F238E27FC236}">
-                <a16:creationId xmlns:a16="http://schemas.microsoft.com/office/drawing/2014/main" id="{84E22EA6-F011-81D0-C0ED-156511373D36}"/>
+                <a16:creationId xmlns:a16="http://schemas.microsoft.com/office/drawing/2014/main" xmlns="" id="{84E22EA6-F011-81D0-C0ED-156511373D36}"/>
               </a:ext>
             </a:extLst>
           </p:cNvPr>
@@ -1153,7 +1158,7 @@
           <p:cNvPr id="3" name="Content Placeholder 2">
             <a:extLst>
               <a:ext uri="{FF2B5EF4-FFF2-40B4-BE49-F238E27FC236}">
-                <a16:creationId xmlns:a16="http://schemas.microsoft.com/office/drawing/2014/main" id="{F131A518-20A3-5D2F-0E56-CE8C14DF8C9C}"/>
+                <a16:creationId xmlns:a16="http://schemas.microsoft.com/office/drawing/2014/main" xmlns="" id="{F131A518-20A3-5D2F-0E56-CE8C14DF8C9C}"/>
               </a:ext>
             </a:extLst>
           </p:cNvPr>
@@ -1210,7 +1215,7 @@
           <p:cNvPr id="4" name="Date Placeholder 3">
             <a:extLst>
               <a:ext uri="{FF2B5EF4-FFF2-40B4-BE49-F238E27FC236}">
-                <a16:creationId xmlns:a16="http://schemas.microsoft.com/office/drawing/2014/main" id="{C39E8D88-7C40-D6EA-C801-7004B82E559F}"/>
+                <a16:creationId xmlns:a16="http://schemas.microsoft.com/office/drawing/2014/main" xmlns="" id="{C39E8D88-7C40-D6EA-C801-7004B82E559F}"/>
               </a:ext>
             </a:extLst>
           </p:cNvPr>
@@ -1228,7 +1233,7 @@
           <a:p>
             <a:fld id="{98235D44-F49E-4F77-A348-B0CDA85E7A83}" type="datetimeFigureOut">
               <a:rPr lang="en-US" smtClean="0"/>
-              <a:t>11/3/2024</a:t>
+              <a:t>11/9/2024</a:t>
             </a:fld>
             <a:endParaRPr lang="en-US"/>
           </a:p>
@@ -1239,7 +1244,7 @@
           <p:cNvPr id="5" name="Footer Placeholder 4">
             <a:extLst>
               <a:ext uri="{FF2B5EF4-FFF2-40B4-BE49-F238E27FC236}">
-                <a16:creationId xmlns:a16="http://schemas.microsoft.com/office/drawing/2014/main" id="{2F8260DA-273E-9730-5618-99CA28D71F74}"/>
+                <a16:creationId xmlns:a16="http://schemas.microsoft.com/office/drawing/2014/main" xmlns="" id="{2F8260DA-273E-9730-5618-99CA28D71F74}"/>
               </a:ext>
             </a:extLst>
           </p:cNvPr>
@@ -1264,7 +1269,7 @@
           <p:cNvPr id="6" name="Slide Number Placeholder 5">
             <a:extLst>
               <a:ext uri="{FF2B5EF4-FFF2-40B4-BE49-F238E27FC236}">
-                <a16:creationId xmlns:a16="http://schemas.microsoft.com/office/drawing/2014/main" id="{50132774-5B01-379E-B018-4A9C359F9C93}"/>
+                <a16:creationId xmlns:a16="http://schemas.microsoft.com/office/drawing/2014/main" xmlns="" id="{50132774-5B01-379E-B018-4A9C359F9C93}"/>
               </a:ext>
             </a:extLst>
           </p:cNvPr>
@@ -1323,7 +1328,7 @@
           <p:cNvPr id="2" name="Title 1">
             <a:extLst>
               <a:ext uri="{FF2B5EF4-FFF2-40B4-BE49-F238E27FC236}">
-                <a16:creationId xmlns:a16="http://schemas.microsoft.com/office/drawing/2014/main" id="{00FB3524-C4D6-30E3-4D4B-0443D14E204B}"/>
+                <a16:creationId xmlns:a16="http://schemas.microsoft.com/office/drawing/2014/main" xmlns="" id="{00FB3524-C4D6-30E3-4D4B-0443D14E204B}"/>
               </a:ext>
             </a:extLst>
           </p:cNvPr>
@@ -1360,7 +1365,7 @@
           <p:cNvPr id="3" name="Text Placeholder 2">
             <a:extLst>
               <a:ext uri="{FF2B5EF4-FFF2-40B4-BE49-F238E27FC236}">
-                <a16:creationId xmlns:a16="http://schemas.microsoft.com/office/drawing/2014/main" id="{A5D1FA1C-A238-5208-BE02-3F4A97CA23FC}"/>
+                <a16:creationId xmlns:a16="http://schemas.microsoft.com/office/drawing/2014/main" xmlns="" id="{A5D1FA1C-A238-5208-BE02-3F4A97CA23FC}"/>
               </a:ext>
             </a:extLst>
           </p:cNvPr>
@@ -1485,7 +1490,7 @@
           <p:cNvPr id="4" name="Date Placeholder 3">
             <a:extLst>
               <a:ext uri="{FF2B5EF4-FFF2-40B4-BE49-F238E27FC236}">
-                <a16:creationId xmlns:a16="http://schemas.microsoft.com/office/drawing/2014/main" id="{800247F4-BC63-27C9-5D19-3C0C02ED9345}"/>
+                <a16:creationId xmlns:a16="http://schemas.microsoft.com/office/drawing/2014/main" xmlns="" id="{800247F4-BC63-27C9-5D19-3C0C02ED9345}"/>
               </a:ext>
             </a:extLst>
           </p:cNvPr>
@@ -1503,7 +1508,7 @@
           <a:p>
             <a:fld id="{98235D44-F49E-4F77-A348-B0CDA85E7A83}" type="datetimeFigureOut">
               <a:rPr lang="en-US" smtClean="0"/>
-              <a:t>11/3/2024</a:t>
+              <a:t>11/9/2024</a:t>
             </a:fld>
             <a:endParaRPr lang="en-US"/>
           </a:p>
@@ -1514,7 +1519,7 @@
           <p:cNvPr id="5" name="Footer Placeholder 4">
             <a:extLst>
               <a:ext uri="{FF2B5EF4-FFF2-40B4-BE49-F238E27FC236}">
-                <a16:creationId xmlns:a16="http://schemas.microsoft.com/office/drawing/2014/main" id="{BC194FA8-D691-0D9E-9120-77618A79867F}"/>
+                <a16:creationId xmlns:a16="http://schemas.microsoft.com/office/drawing/2014/main" xmlns="" id="{BC194FA8-D691-0D9E-9120-77618A79867F}"/>
               </a:ext>
             </a:extLst>
           </p:cNvPr>
@@ -1539,7 +1544,7 @@
           <p:cNvPr id="6" name="Slide Number Placeholder 5">
             <a:extLst>
               <a:ext uri="{FF2B5EF4-FFF2-40B4-BE49-F238E27FC236}">
-                <a16:creationId xmlns:a16="http://schemas.microsoft.com/office/drawing/2014/main" id="{072E3DB1-DA2C-41DA-6AD2-74A29F7CD026}"/>
+                <a16:creationId xmlns:a16="http://schemas.microsoft.com/office/drawing/2014/main" xmlns="" id="{072E3DB1-DA2C-41DA-6AD2-74A29F7CD026}"/>
               </a:ext>
             </a:extLst>
           </p:cNvPr>
@@ -1598,7 +1603,7 @@
           <p:cNvPr id="2" name="Title 1">
             <a:extLst>
               <a:ext uri="{FF2B5EF4-FFF2-40B4-BE49-F238E27FC236}">
-                <a16:creationId xmlns:a16="http://schemas.microsoft.com/office/drawing/2014/main" id="{D68B1386-0E2D-5C90-1B89-3B5418CF7ED3}"/>
+                <a16:creationId xmlns:a16="http://schemas.microsoft.com/office/drawing/2014/main" xmlns="" id="{D68B1386-0E2D-5C90-1B89-3B5418CF7ED3}"/>
               </a:ext>
             </a:extLst>
           </p:cNvPr>
@@ -1626,7 +1631,7 @@
           <p:cNvPr id="3" name="Content Placeholder 2">
             <a:extLst>
               <a:ext uri="{FF2B5EF4-FFF2-40B4-BE49-F238E27FC236}">
-                <a16:creationId xmlns:a16="http://schemas.microsoft.com/office/drawing/2014/main" id="{BE2FA58E-2FC7-158F-57C9-FA55B827EE2C}"/>
+                <a16:creationId xmlns:a16="http://schemas.microsoft.com/office/drawing/2014/main" xmlns="" id="{BE2FA58E-2FC7-158F-57C9-FA55B827EE2C}"/>
               </a:ext>
             </a:extLst>
           </p:cNvPr>
@@ -1688,7 +1693,7 @@
           <p:cNvPr id="4" name="Content Placeholder 3">
             <a:extLst>
               <a:ext uri="{FF2B5EF4-FFF2-40B4-BE49-F238E27FC236}">
-                <a16:creationId xmlns:a16="http://schemas.microsoft.com/office/drawing/2014/main" id="{5E19EEDA-1B50-C4A1-AA84-BDCE2951D7AC}"/>
+                <a16:creationId xmlns:a16="http://schemas.microsoft.com/office/drawing/2014/main" xmlns="" id="{5E19EEDA-1B50-C4A1-AA84-BDCE2951D7AC}"/>
               </a:ext>
             </a:extLst>
           </p:cNvPr>
@@ -1750,7 +1755,7 @@
           <p:cNvPr id="5" name="Date Placeholder 4">
             <a:extLst>
               <a:ext uri="{FF2B5EF4-FFF2-40B4-BE49-F238E27FC236}">
-                <a16:creationId xmlns:a16="http://schemas.microsoft.com/office/drawing/2014/main" id="{3F78F499-4FC9-1D3E-1E41-F30EE944124A}"/>
+                <a16:creationId xmlns:a16="http://schemas.microsoft.com/office/drawing/2014/main" xmlns="" id="{3F78F499-4FC9-1D3E-1E41-F30EE944124A}"/>
               </a:ext>
             </a:extLst>
           </p:cNvPr>
@@ -1768,7 +1773,7 @@
           <a:p>
             <a:fld id="{98235D44-F49E-4F77-A348-B0CDA85E7A83}" type="datetimeFigureOut">
               <a:rPr lang="en-US" smtClean="0"/>
-              <a:t>11/3/2024</a:t>
+              <a:t>11/9/2024</a:t>
             </a:fld>
             <a:endParaRPr lang="en-US"/>
           </a:p>
@@ -1779,7 +1784,7 @@
           <p:cNvPr id="6" name="Footer Placeholder 5">
             <a:extLst>
               <a:ext uri="{FF2B5EF4-FFF2-40B4-BE49-F238E27FC236}">
-                <a16:creationId xmlns:a16="http://schemas.microsoft.com/office/drawing/2014/main" id="{46B62AD9-1B9C-DABA-B54D-C1E21197DAB2}"/>
+                <a16:creationId xmlns:a16="http://schemas.microsoft.com/office/drawing/2014/main" xmlns="" id="{46B62AD9-1B9C-DABA-B54D-C1E21197DAB2}"/>
               </a:ext>
             </a:extLst>
           </p:cNvPr>
@@ -1804,7 +1809,7 @@
           <p:cNvPr id="7" name="Slide Number Placeholder 6">
             <a:extLst>
               <a:ext uri="{FF2B5EF4-FFF2-40B4-BE49-F238E27FC236}">
-                <a16:creationId xmlns:a16="http://schemas.microsoft.com/office/drawing/2014/main" id="{F844C1F3-1ACA-6BE7-97C3-B4EA973CF4CE}"/>
+                <a16:creationId xmlns:a16="http://schemas.microsoft.com/office/drawing/2014/main" xmlns="" id="{F844C1F3-1ACA-6BE7-97C3-B4EA973CF4CE}"/>
               </a:ext>
             </a:extLst>
           </p:cNvPr>
@@ -1863,7 +1868,7 @@
           <p:cNvPr id="2" name="Title 1">
             <a:extLst>
               <a:ext uri="{FF2B5EF4-FFF2-40B4-BE49-F238E27FC236}">
-                <a16:creationId xmlns:a16="http://schemas.microsoft.com/office/drawing/2014/main" id="{09A128E3-5716-3024-9D46-E59D7B932FF6}"/>
+                <a16:creationId xmlns:a16="http://schemas.microsoft.com/office/drawing/2014/main" xmlns="" id="{09A128E3-5716-3024-9D46-E59D7B932FF6}"/>
               </a:ext>
             </a:extLst>
           </p:cNvPr>
@@ -1896,7 +1901,7 @@
           <p:cNvPr id="3" name="Text Placeholder 2">
             <a:extLst>
               <a:ext uri="{FF2B5EF4-FFF2-40B4-BE49-F238E27FC236}">
-                <a16:creationId xmlns:a16="http://schemas.microsoft.com/office/drawing/2014/main" id="{903AEA5E-7524-8500-1847-1F745A90F0BE}"/>
+                <a16:creationId xmlns:a16="http://schemas.microsoft.com/office/drawing/2014/main" xmlns="" id="{903AEA5E-7524-8500-1847-1F745A90F0BE}"/>
               </a:ext>
             </a:extLst>
           </p:cNvPr>
@@ -1967,7 +1972,7 @@
           <p:cNvPr id="4" name="Content Placeholder 3">
             <a:extLst>
               <a:ext uri="{FF2B5EF4-FFF2-40B4-BE49-F238E27FC236}">
-                <a16:creationId xmlns:a16="http://schemas.microsoft.com/office/drawing/2014/main" id="{26385443-3F52-B4D9-DC5E-FBD9AFCC8004}"/>
+                <a16:creationId xmlns:a16="http://schemas.microsoft.com/office/drawing/2014/main" xmlns="" id="{26385443-3F52-B4D9-DC5E-FBD9AFCC8004}"/>
               </a:ext>
             </a:extLst>
           </p:cNvPr>
@@ -2029,7 +2034,7 @@
           <p:cNvPr id="5" name="Text Placeholder 4">
             <a:extLst>
               <a:ext uri="{FF2B5EF4-FFF2-40B4-BE49-F238E27FC236}">
-                <a16:creationId xmlns:a16="http://schemas.microsoft.com/office/drawing/2014/main" id="{35F61570-4F38-4CDB-A24E-DD8FAFC8576C}"/>
+                <a16:creationId xmlns:a16="http://schemas.microsoft.com/office/drawing/2014/main" xmlns="" id="{35F61570-4F38-4CDB-A24E-DD8FAFC8576C}"/>
               </a:ext>
             </a:extLst>
           </p:cNvPr>
@@ -2100,7 +2105,7 @@
           <p:cNvPr id="6" name="Content Placeholder 5">
             <a:extLst>
               <a:ext uri="{FF2B5EF4-FFF2-40B4-BE49-F238E27FC236}">
-                <a16:creationId xmlns:a16="http://schemas.microsoft.com/office/drawing/2014/main" id="{A684AE46-B417-9498-ACA0-B5C29C74F994}"/>
+                <a16:creationId xmlns:a16="http://schemas.microsoft.com/office/drawing/2014/main" xmlns="" id="{A684AE46-B417-9498-ACA0-B5C29C74F994}"/>
               </a:ext>
             </a:extLst>
           </p:cNvPr>
@@ -2162,7 +2167,7 @@
           <p:cNvPr id="7" name="Date Placeholder 6">
             <a:extLst>
               <a:ext uri="{FF2B5EF4-FFF2-40B4-BE49-F238E27FC236}">
-                <a16:creationId xmlns:a16="http://schemas.microsoft.com/office/drawing/2014/main" id="{0A6D5722-A5AB-C98A-3760-C4A46DB3E4F2}"/>
+                <a16:creationId xmlns:a16="http://schemas.microsoft.com/office/drawing/2014/main" xmlns="" id="{0A6D5722-A5AB-C98A-3760-C4A46DB3E4F2}"/>
               </a:ext>
             </a:extLst>
           </p:cNvPr>
@@ -2180,7 +2185,7 @@
           <a:p>
             <a:fld id="{98235D44-F49E-4F77-A348-B0CDA85E7A83}" type="datetimeFigureOut">
               <a:rPr lang="en-US" smtClean="0"/>
-              <a:t>11/3/2024</a:t>
+              <a:t>11/9/2024</a:t>
             </a:fld>
             <a:endParaRPr lang="en-US"/>
           </a:p>
@@ -2191,7 +2196,7 @@
           <p:cNvPr id="8" name="Footer Placeholder 7">
             <a:extLst>
               <a:ext uri="{FF2B5EF4-FFF2-40B4-BE49-F238E27FC236}">
-                <a16:creationId xmlns:a16="http://schemas.microsoft.com/office/drawing/2014/main" id="{8ADE145D-2965-4477-6BE6-F32EB844DBAB}"/>
+                <a16:creationId xmlns:a16="http://schemas.microsoft.com/office/drawing/2014/main" xmlns="" id="{8ADE145D-2965-4477-6BE6-F32EB844DBAB}"/>
               </a:ext>
             </a:extLst>
           </p:cNvPr>
@@ -2216,7 +2221,7 @@
           <p:cNvPr id="9" name="Slide Number Placeholder 8">
             <a:extLst>
               <a:ext uri="{FF2B5EF4-FFF2-40B4-BE49-F238E27FC236}">
-                <a16:creationId xmlns:a16="http://schemas.microsoft.com/office/drawing/2014/main" id="{B710E74F-2313-3984-02CF-47253D50D1DB}"/>
+                <a16:creationId xmlns:a16="http://schemas.microsoft.com/office/drawing/2014/main" xmlns="" id="{B710E74F-2313-3984-02CF-47253D50D1DB}"/>
               </a:ext>
             </a:extLst>
           </p:cNvPr>
@@ -2275,7 +2280,7 @@
           <p:cNvPr id="2" name="Title 1">
             <a:extLst>
               <a:ext uri="{FF2B5EF4-FFF2-40B4-BE49-F238E27FC236}">
-                <a16:creationId xmlns:a16="http://schemas.microsoft.com/office/drawing/2014/main" id="{D04FF4D3-F102-6994-FA69-5C26730E7C18}"/>
+                <a16:creationId xmlns:a16="http://schemas.microsoft.com/office/drawing/2014/main" xmlns="" id="{D04FF4D3-F102-6994-FA69-5C26730E7C18}"/>
               </a:ext>
             </a:extLst>
           </p:cNvPr>
@@ -2303,7 +2308,7 @@
           <p:cNvPr id="3" name="Date Placeholder 2">
             <a:extLst>
               <a:ext uri="{FF2B5EF4-FFF2-40B4-BE49-F238E27FC236}">
-                <a16:creationId xmlns:a16="http://schemas.microsoft.com/office/drawing/2014/main" id="{FDD70FFA-1560-4913-A4E9-9FECE4917152}"/>
+                <a16:creationId xmlns:a16="http://schemas.microsoft.com/office/drawing/2014/main" xmlns="" id="{FDD70FFA-1560-4913-A4E9-9FECE4917152}"/>
               </a:ext>
             </a:extLst>
           </p:cNvPr>
@@ -2321,7 +2326,7 @@
           <a:p>
             <a:fld id="{98235D44-F49E-4F77-A348-B0CDA85E7A83}" type="datetimeFigureOut">
               <a:rPr lang="en-US" smtClean="0"/>
-              <a:t>11/3/2024</a:t>
+              <a:t>11/9/2024</a:t>
             </a:fld>
             <a:endParaRPr lang="en-US"/>
           </a:p>
@@ -2332,7 +2337,7 @@
           <p:cNvPr id="4" name="Footer Placeholder 3">
             <a:extLst>
               <a:ext uri="{FF2B5EF4-FFF2-40B4-BE49-F238E27FC236}">
-                <a16:creationId xmlns:a16="http://schemas.microsoft.com/office/drawing/2014/main" id="{5CED9349-2BF4-715A-1D0D-66B2F7755624}"/>
+                <a16:creationId xmlns:a16="http://schemas.microsoft.com/office/drawing/2014/main" xmlns="" id="{5CED9349-2BF4-715A-1D0D-66B2F7755624}"/>
               </a:ext>
             </a:extLst>
           </p:cNvPr>
@@ -2357,7 +2362,7 @@
           <p:cNvPr id="5" name="Slide Number Placeholder 4">
             <a:extLst>
               <a:ext uri="{FF2B5EF4-FFF2-40B4-BE49-F238E27FC236}">
-                <a16:creationId xmlns:a16="http://schemas.microsoft.com/office/drawing/2014/main" id="{4E376E25-195F-FFE9-1361-CEACAF8E3FFC}"/>
+                <a16:creationId xmlns:a16="http://schemas.microsoft.com/office/drawing/2014/main" xmlns="" id="{4E376E25-195F-FFE9-1361-CEACAF8E3FFC}"/>
               </a:ext>
             </a:extLst>
           </p:cNvPr>
@@ -2416,7 +2421,7 @@
           <p:cNvPr id="2" name="Date Placeholder 1">
             <a:extLst>
               <a:ext uri="{FF2B5EF4-FFF2-40B4-BE49-F238E27FC236}">
-                <a16:creationId xmlns:a16="http://schemas.microsoft.com/office/drawing/2014/main" id="{888CE8D8-AA39-0D35-7F03-0BCCC48CF4E8}"/>
+                <a16:creationId xmlns:a16="http://schemas.microsoft.com/office/drawing/2014/main" xmlns="" id="{888CE8D8-AA39-0D35-7F03-0BCCC48CF4E8}"/>
               </a:ext>
             </a:extLst>
           </p:cNvPr>
@@ -2434,7 +2439,7 @@
           <a:p>
             <a:fld id="{98235D44-F49E-4F77-A348-B0CDA85E7A83}" type="datetimeFigureOut">
               <a:rPr lang="en-US" smtClean="0"/>
-              <a:t>11/3/2024</a:t>
+              <a:t>11/9/2024</a:t>
             </a:fld>
             <a:endParaRPr lang="en-US"/>
           </a:p>
@@ -2445,7 +2450,7 @@
           <p:cNvPr id="3" name="Footer Placeholder 2">
             <a:extLst>
               <a:ext uri="{FF2B5EF4-FFF2-40B4-BE49-F238E27FC236}">
-                <a16:creationId xmlns:a16="http://schemas.microsoft.com/office/drawing/2014/main" id="{D5D0993D-B522-8602-EDA4-47C7C80D3A9A}"/>
+                <a16:creationId xmlns:a16="http://schemas.microsoft.com/office/drawing/2014/main" xmlns="" id="{D5D0993D-B522-8602-EDA4-47C7C80D3A9A}"/>
               </a:ext>
             </a:extLst>
           </p:cNvPr>
@@ -2470,7 +2475,7 @@
           <p:cNvPr id="4" name="Slide Number Placeholder 3">
             <a:extLst>
               <a:ext uri="{FF2B5EF4-FFF2-40B4-BE49-F238E27FC236}">
-                <a16:creationId xmlns:a16="http://schemas.microsoft.com/office/drawing/2014/main" id="{D2DFDD99-8F35-0B5C-EA47-3CE1D767F1D7}"/>
+                <a16:creationId xmlns:a16="http://schemas.microsoft.com/office/drawing/2014/main" xmlns="" id="{D2DFDD99-8F35-0B5C-EA47-3CE1D767F1D7}"/>
               </a:ext>
             </a:extLst>
           </p:cNvPr>
@@ -2529,7 +2534,7 @@
           <p:cNvPr id="2" name="Title 1">
             <a:extLst>
               <a:ext uri="{FF2B5EF4-FFF2-40B4-BE49-F238E27FC236}">
-                <a16:creationId xmlns:a16="http://schemas.microsoft.com/office/drawing/2014/main" id="{409C0E09-3F32-A176-2CEC-80DE25093100}"/>
+                <a16:creationId xmlns:a16="http://schemas.microsoft.com/office/drawing/2014/main" xmlns="" id="{409C0E09-3F32-A176-2CEC-80DE25093100}"/>
               </a:ext>
             </a:extLst>
           </p:cNvPr>
@@ -2566,7 +2571,7 @@
           <p:cNvPr id="3" name="Content Placeholder 2">
             <a:extLst>
               <a:ext uri="{FF2B5EF4-FFF2-40B4-BE49-F238E27FC236}">
-                <a16:creationId xmlns:a16="http://schemas.microsoft.com/office/drawing/2014/main" id="{96161A0A-5C2F-040B-0B8B-2C8A80CBD3D9}"/>
+                <a16:creationId xmlns:a16="http://schemas.microsoft.com/office/drawing/2014/main" xmlns="" id="{96161A0A-5C2F-040B-0B8B-2C8A80CBD3D9}"/>
               </a:ext>
             </a:extLst>
           </p:cNvPr>
@@ -2656,7 +2661,7 @@
           <p:cNvPr id="4" name="Text Placeholder 3">
             <a:extLst>
               <a:ext uri="{FF2B5EF4-FFF2-40B4-BE49-F238E27FC236}">
-                <a16:creationId xmlns:a16="http://schemas.microsoft.com/office/drawing/2014/main" id="{230714B7-95F4-FD5A-4EFA-6E1CB9AC75D1}"/>
+                <a16:creationId xmlns:a16="http://schemas.microsoft.com/office/drawing/2014/main" xmlns="" id="{230714B7-95F4-FD5A-4EFA-6E1CB9AC75D1}"/>
               </a:ext>
             </a:extLst>
           </p:cNvPr>
@@ -2727,7 +2732,7 @@
           <p:cNvPr id="5" name="Date Placeholder 4">
             <a:extLst>
               <a:ext uri="{FF2B5EF4-FFF2-40B4-BE49-F238E27FC236}">
-                <a16:creationId xmlns:a16="http://schemas.microsoft.com/office/drawing/2014/main" id="{ACA955DA-6E22-361C-D051-1DEDC7B93482}"/>
+                <a16:creationId xmlns:a16="http://schemas.microsoft.com/office/drawing/2014/main" xmlns="" id="{ACA955DA-6E22-361C-D051-1DEDC7B93482}"/>
               </a:ext>
             </a:extLst>
           </p:cNvPr>
@@ -2745,7 +2750,7 @@
           <a:p>
             <a:fld id="{98235D44-F49E-4F77-A348-B0CDA85E7A83}" type="datetimeFigureOut">
               <a:rPr lang="en-US" smtClean="0"/>
-              <a:t>11/3/2024</a:t>
+              <a:t>11/9/2024</a:t>
             </a:fld>
             <a:endParaRPr lang="en-US"/>
           </a:p>
@@ -2756,7 +2761,7 @@
           <p:cNvPr id="6" name="Footer Placeholder 5">
             <a:extLst>
               <a:ext uri="{FF2B5EF4-FFF2-40B4-BE49-F238E27FC236}">
-                <a16:creationId xmlns:a16="http://schemas.microsoft.com/office/drawing/2014/main" id="{35E37E4F-2A21-0255-AF4B-171A69863F92}"/>
+                <a16:creationId xmlns:a16="http://schemas.microsoft.com/office/drawing/2014/main" xmlns="" id="{35E37E4F-2A21-0255-AF4B-171A69863F92}"/>
               </a:ext>
             </a:extLst>
           </p:cNvPr>
@@ -2781,7 +2786,7 @@
           <p:cNvPr id="7" name="Slide Number Placeholder 6">
             <a:extLst>
               <a:ext uri="{FF2B5EF4-FFF2-40B4-BE49-F238E27FC236}">
-                <a16:creationId xmlns:a16="http://schemas.microsoft.com/office/drawing/2014/main" id="{18E00153-4ED2-57CB-DE0A-9D5BEA86DAE0}"/>
+                <a16:creationId xmlns:a16="http://schemas.microsoft.com/office/drawing/2014/main" xmlns="" id="{18E00153-4ED2-57CB-DE0A-9D5BEA86DAE0}"/>
               </a:ext>
             </a:extLst>
           </p:cNvPr>
@@ -2840,7 +2845,7 @@
           <p:cNvPr id="2" name="Title 1">
             <a:extLst>
               <a:ext uri="{FF2B5EF4-FFF2-40B4-BE49-F238E27FC236}">
-                <a16:creationId xmlns:a16="http://schemas.microsoft.com/office/drawing/2014/main" id="{4F190398-F10E-E9EC-25DD-9CB1BB6771B2}"/>
+                <a16:creationId xmlns:a16="http://schemas.microsoft.com/office/drawing/2014/main" xmlns="" id="{4F190398-F10E-E9EC-25DD-9CB1BB6771B2}"/>
               </a:ext>
             </a:extLst>
           </p:cNvPr>
@@ -2877,7 +2882,7 @@
           <p:cNvPr id="3" name="Picture Placeholder 2">
             <a:extLst>
               <a:ext uri="{FF2B5EF4-FFF2-40B4-BE49-F238E27FC236}">
-                <a16:creationId xmlns:a16="http://schemas.microsoft.com/office/drawing/2014/main" id="{D893508A-77DE-4D92-69DC-11609AAA1531}"/>
+                <a16:creationId xmlns:a16="http://schemas.microsoft.com/office/drawing/2014/main" xmlns="" id="{D893508A-77DE-4D92-69DC-11609AAA1531}"/>
               </a:ext>
             </a:extLst>
           </p:cNvPr>
@@ -2944,7 +2949,7 @@
           <p:cNvPr id="4" name="Text Placeholder 3">
             <a:extLst>
               <a:ext uri="{FF2B5EF4-FFF2-40B4-BE49-F238E27FC236}">
-                <a16:creationId xmlns:a16="http://schemas.microsoft.com/office/drawing/2014/main" id="{7AFCBC79-8C85-31AF-D1C8-F2AF64DAB98F}"/>
+                <a16:creationId xmlns:a16="http://schemas.microsoft.com/office/drawing/2014/main" xmlns="" id="{7AFCBC79-8C85-31AF-D1C8-F2AF64DAB98F}"/>
               </a:ext>
             </a:extLst>
           </p:cNvPr>
@@ -3015,7 +3020,7 @@
           <p:cNvPr id="5" name="Date Placeholder 4">
             <a:extLst>
               <a:ext uri="{FF2B5EF4-FFF2-40B4-BE49-F238E27FC236}">
-                <a16:creationId xmlns:a16="http://schemas.microsoft.com/office/drawing/2014/main" id="{76389C7E-9267-3EDF-003D-7C0FDBFA508F}"/>
+                <a16:creationId xmlns:a16="http://schemas.microsoft.com/office/drawing/2014/main" xmlns="" id="{76389C7E-9267-3EDF-003D-7C0FDBFA508F}"/>
               </a:ext>
             </a:extLst>
           </p:cNvPr>
@@ -3033,7 +3038,7 @@
           <a:p>
             <a:fld id="{98235D44-F49E-4F77-A348-B0CDA85E7A83}" type="datetimeFigureOut">
               <a:rPr lang="en-US" smtClean="0"/>
-              <a:t>11/3/2024</a:t>
+              <a:t>11/9/2024</a:t>
             </a:fld>
             <a:endParaRPr lang="en-US"/>
           </a:p>
@@ -3044,7 +3049,7 @@
           <p:cNvPr id="6" name="Footer Placeholder 5">
             <a:extLst>
               <a:ext uri="{FF2B5EF4-FFF2-40B4-BE49-F238E27FC236}">
-                <a16:creationId xmlns:a16="http://schemas.microsoft.com/office/drawing/2014/main" id="{1B14C527-EFB6-DFF4-9FEB-0D9DFB2B6811}"/>
+                <a16:creationId xmlns:a16="http://schemas.microsoft.com/office/drawing/2014/main" xmlns="" id="{1B14C527-EFB6-DFF4-9FEB-0D9DFB2B6811}"/>
               </a:ext>
             </a:extLst>
           </p:cNvPr>
@@ -3069,7 +3074,7 @@
           <p:cNvPr id="7" name="Slide Number Placeholder 6">
             <a:extLst>
               <a:ext uri="{FF2B5EF4-FFF2-40B4-BE49-F238E27FC236}">
-                <a16:creationId xmlns:a16="http://schemas.microsoft.com/office/drawing/2014/main" id="{04F8F925-6262-B826-A3DD-C173AE89BFB6}"/>
+                <a16:creationId xmlns:a16="http://schemas.microsoft.com/office/drawing/2014/main" xmlns="" id="{04F8F925-6262-B826-A3DD-C173AE89BFB6}"/>
               </a:ext>
             </a:extLst>
           </p:cNvPr>
@@ -3133,7 +3138,7 @@
           <p:cNvPr id="2" name="Title Placeholder 1">
             <a:extLst>
               <a:ext uri="{FF2B5EF4-FFF2-40B4-BE49-F238E27FC236}">
-                <a16:creationId xmlns:a16="http://schemas.microsoft.com/office/drawing/2014/main" id="{B32AADF5-564A-6FC8-DA02-52CD62EE83BB}"/>
+                <a16:creationId xmlns:a16="http://schemas.microsoft.com/office/drawing/2014/main" xmlns="" id="{B32AADF5-564A-6FC8-DA02-52CD62EE83BB}"/>
               </a:ext>
             </a:extLst>
           </p:cNvPr>
@@ -3171,7 +3176,7 @@
           <p:cNvPr id="3" name="Text Placeholder 2">
             <a:extLst>
               <a:ext uri="{FF2B5EF4-FFF2-40B4-BE49-F238E27FC236}">
-                <a16:creationId xmlns:a16="http://schemas.microsoft.com/office/drawing/2014/main" id="{FCA809DA-1918-6B6E-84B9-7AF4846B4EF4}"/>
+                <a16:creationId xmlns:a16="http://schemas.microsoft.com/office/drawing/2014/main" xmlns="" id="{FCA809DA-1918-6B6E-84B9-7AF4846B4EF4}"/>
               </a:ext>
             </a:extLst>
           </p:cNvPr>
@@ -3238,7 +3243,7 @@
           <p:cNvPr id="4" name="Date Placeholder 3">
             <a:extLst>
               <a:ext uri="{FF2B5EF4-FFF2-40B4-BE49-F238E27FC236}">
-                <a16:creationId xmlns:a16="http://schemas.microsoft.com/office/drawing/2014/main" id="{770793CA-3E15-F6B2-B2A1-34FDFAE0C83D}"/>
+                <a16:creationId xmlns:a16="http://schemas.microsoft.com/office/drawing/2014/main" xmlns="" id="{770793CA-3E15-F6B2-B2A1-34FDFAE0C83D}"/>
               </a:ext>
             </a:extLst>
           </p:cNvPr>
@@ -3274,7 +3279,7 @@
           <a:p>
             <a:fld id="{98235D44-F49E-4F77-A348-B0CDA85E7A83}" type="datetimeFigureOut">
               <a:rPr lang="en-US" smtClean="0"/>
-              <a:t>11/3/2024</a:t>
+              <a:t>11/9/2024</a:t>
             </a:fld>
             <a:endParaRPr lang="en-US"/>
           </a:p>
@@ -3285,7 +3290,7 @@
           <p:cNvPr id="5" name="Footer Placeholder 4">
             <a:extLst>
               <a:ext uri="{FF2B5EF4-FFF2-40B4-BE49-F238E27FC236}">
-                <a16:creationId xmlns:a16="http://schemas.microsoft.com/office/drawing/2014/main" id="{AB07A422-CD51-D5AD-C86C-33D1D909F553}"/>
+                <a16:creationId xmlns:a16="http://schemas.microsoft.com/office/drawing/2014/main" xmlns="" id="{AB07A422-CD51-D5AD-C86C-33D1D909F553}"/>
               </a:ext>
             </a:extLst>
           </p:cNvPr>
@@ -3328,7 +3333,7 @@
           <p:cNvPr id="6" name="Slide Number Placeholder 5">
             <a:extLst>
               <a:ext uri="{FF2B5EF4-FFF2-40B4-BE49-F238E27FC236}">
-                <a16:creationId xmlns:a16="http://schemas.microsoft.com/office/drawing/2014/main" id="{CF4075A9-3CCD-DE39-76BC-8197600561E6}"/>
+                <a16:creationId xmlns:a16="http://schemas.microsoft.com/office/drawing/2014/main" xmlns="" id="{CF4075A9-3CCD-DE39-76BC-8197600561E6}"/>
               </a:ext>
             </a:extLst>
           </p:cNvPr>
@@ -3696,7 +3701,7 @@
           <p:cNvPr id="9" name="Picture 8">
             <a:extLst>
               <a:ext uri="{FF2B5EF4-FFF2-40B4-BE49-F238E27FC236}">
-                <a16:creationId xmlns:a16="http://schemas.microsoft.com/office/drawing/2014/main" id="{FFF4CB80-36A6-53FE-DF95-D3C353FD1650}"/>
+                <a16:creationId xmlns:a16="http://schemas.microsoft.com/office/drawing/2014/main" xmlns="" id="{FFF4CB80-36A6-53FE-DF95-D3C353FD1650}"/>
               </a:ext>
             </a:extLst>
           </p:cNvPr>
@@ -3732,7 +3737,7 @@
           <p:cNvPr id="16" name="Freeform: Shape 15">
             <a:extLst>
               <a:ext uri="{FF2B5EF4-FFF2-40B4-BE49-F238E27FC236}">
-                <a16:creationId xmlns:a16="http://schemas.microsoft.com/office/drawing/2014/main" id="{D04DD9E0-1FC1-F470-8348-5EAB7269C492}"/>
+                <a16:creationId xmlns:a16="http://schemas.microsoft.com/office/drawing/2014/main" xmlns="" id="{D04DD9E0-1FC1-F470-8348-5EAB7269C492}"/>
               </a:ext>
             </a:extLst>
           </p:cNvPr>
@@ -7866,7 +7871,7 @@
           <p:cNvPr id="3" name="Subtitle 2">
             <a:extLst>
               <a:ext uri="{FF2B5EF4-FFF2-40B4-BE49-F238E27FC236}">
-                <a16:creationId xmlns:a16="http://schemas.microsoft.com/office/drawing/2014/main" id="{40EC00D6-6139-ECCB-3970-DF39A63CDA01}"/>
+                <a16:creationId xmlns:a16="http://schemas.microsoft.com/office/drawing/2014/main" xmlns="" id="{40EC00D6-6139-ECCB-3970-DF39A63CDA01}"/>
               </a:ext>
             </a:extLst>
           </p:cNvPr>
@@ -7890,6 +7895,16 @@
           <a:lstStyle/>
           <a:p>
             <a:pPr algn="r"/>
+            <a:r>
+              <a:rPr lang="en-US" sz="1800" dirty="0">
+                <a:solidFill>
+                  <a:schemeClr val="bg1">
+                    <a:lumMod val="75000"/>
+                  </a:schemeClr>
+                </a:solidFill>
+              </a:rPr>
+              <a:t/>
+            </a:r>
             <a:br>
               <a:rPr lang="en-US" sz="1800" dirty="0">
                 <a:solidFill>
@@ -8023,7 +8038,7 @@
           <p:cNvPr id="2" name="TextBox 1">
             <a:extLst>
               <a:ext uri="{FF2B5EF4-FFF2-40B4-BE49-F238E27FC236}">
-                <a16:creationId xmlns:a16="http://schemas.microsoft.com/office/drawing/2014/main" id="{199B9149-BCE3-E8FF-B980-A671C271C1F7}"/>
+                <a16:creationId xmlns:a16="http://schemas.microsoft.com/office/drawing/2014/main" xmlns="" id="{199B9149-BCE3-E8FF-B980-A671C271C1F7}"/>
               </a:ext>
             </a:extLst>
           </p:cNvPr>
@@ -8070,7 +8085,7 @@
           <p:cNvPr id="3" name="TextBox 2">
             <a:extLst>
               <a:ext uri="{FF2B5EF4-FFF2-40B4-BE49-F238E27FC236}">
-                <a16:creationId xmlns:a16="http://schemas.microsoft.com/office/drawing/2014/main" id="{2A3DBAD7-0349-C138-49F2-34BA414DC8BC}"/>
+                <a16:creationId xmlns:a16="http://schemas.microsoft.com/office/drawing/2014/main" xmlns="" id="{2A3DBAD7-0349-C138-49F2-34BA414DC8BC}"/>
               </a:ext>
             </a:extLst>
           </p:cNvPr>
@@ -8272,7 +8287,7 @@
           <p:cNvPr id="2" name="Title 1">
             <a:extLst>
               <a:ext uri="{FF2B5EF4-FFF2-40B4-BE49-F238E27FC236}">
-                <a16:creationId xmlns:a16="http://schemas.microsoft.com/office/drawing/2014/main" id="{4F6E24A9-DAC8-3CD7-F6AF-35F942D93487}"/>
+                <a16:creationId xmlns:a16="http://schemas.microsoft.com/office/drawing/2014/main" xmlns="" id="{4F6E24A9-DAC8-3CD7-F6AF-35F942D93487}"/>
               </a:ext>
             </a:extLst>
           </p:cNvPr>
@@ -8309,7 +8324,7 @@
           <p:cNvPr id="3" name="Content Placeholder 2">
             <a:extLst>
               <a:ext uri="{FF2B5EF4-FFF2-40B4-BE49-F238E27FC236}">
-                <a16:creationId xmlns:a16="http://schemas.microsoft.com/office/drawing/2014/main" id="{A9173C1D-2F8B-2792-3149-B0AB3328C944}"/>
+                <a16:creationId xmlns:a16="http://schemas.microsoft.com/office/drawing/2014/main" xmlns="" id="{A9173C1D-2F8B-2792-3149-B0AB3328C944}"/>
               </a:ext>
             </a:extLst>
           </p:cNvPr>
@@ -8334,7 +8349,7 @@
           <p:cNvPr id="4" name="Text Placeholder 3">
             <a:extLst>
               <a:ext uri="{FF2B5EF4-FFF2-40B4-BE49-F238E27FC236}">
-                <a16:creationId xmlns:a16="http://schemas.microsoft.com/office/drawing/2014/main" id="{2575CAD2-AC30-D5F5-9D23-CF4A3F0D6D87}"/>
+                <a16:creationId xmlns:a16="http://schemas.microsoft.com/office/drawing/2014/main" xmlns="" id="{2575CAD2-AC30-D5F5-9D23-CF4A3F0D6D87}"/>
               </a:ext>
             </a:extLst>
           </p:cNvPr>
@@ -8404,7 +8419,7 @@
           <p:cNvPr id="2" name="Title 1">
             <a:extLst>
               <a:ext uri="{FF2B5EF4-FFF2-40B4-BE49-F238E27FC236}">
-                <a16:creationId xmlns:a16="http://schemas.microsoft.com/office/drawing/2014/main" id="{A044EC92-8709-66AA-FA34-6F35A4198D12}"/>
+                <a16:creationId xmlns:a16="http://schemas.microsoft.com/office/drawing/2014/main" xmlns="" id="{A044EC92-8709-66AA-FA34-6F35A4198D12}"/>
               </a:ext>
             </a:extLst>
           </p:cNvPr>
@@ -8445,7 +8460,7 @@
           <p:cNvPr id="4" name="Text Placeholder 3">
             <a:extLst>
               <a:ext uri="{FF2B5EF4-FFF2-40B4-BE49-F238E27FC236}">
-                <a16:creationId xmlns:a16="http://schemas.microsoft.com/office/drawing/2014/main" id="{8AF72E6F-D5A1-6CBE-73C8-608D6839317F}"/>
+                <a16:creationId xmlns:a16="http://schemas.microsoft.com/office/drawing/2014/main" xmlns="" id="{8AF72E6F-D5A1-6CBE-73C8-608D6839317F}"/>
               </a:ext>
             </a:extLst>
           </p:cNvPr>
@@ -8473,7 +8488,7 @@
           <p:cNvPr id="3" name="Content Placeholder 2">
             <a:extLst>
               <a:ext uri="{FF2B5EF4-FFF2-40B4-BE49-F238E27FC236}">
-                <a16:creationId xmlns:a16="http://schemas.microsoft.com/office/drawing/2014/main" id="{D5E016E4-BDAF-4DC3-9D94-4DE8B9339639}"/>
+                <a16:creationId xmlns:a16="http://schemas.microsoft.com/office/drawing/2014/main" xmlns="" id="{D5E016E4-BDAF-4DC3-9D94-4DE8B9339639}"/>
               </a:ext>
             </a:extLst>
           </p:cNvPr>
@@ -8528,7 +8543,7 @@
           <p:cNvPr id="2" name="TextBox 1">
             <a:extLst>
               <a:ext uri="{FF2B5EF4-FFF2-40B4-BE49-F238E27FC236}">
-                <a16:creationId xmlns:a16="http://schemas.microsoft.com/office/drawing/2014/main" id="{6E50E356-37DA-4535-A5F0-B50C7D4B463F}"/>
+                <a16:creationId xmlns:a16="http://schemas.microsoft.com/office/drawing/2014/main" xmlns="" id="{6E50E356-37DA-4535-A5F0-B50C7D4B463F}"/>
               </a:ext>
             </a:extLst>
           </p:cNvPr>
@@ -8565,7 +8580,7 @@
           <p:cNvPr id="3" name="TextBox 2">
             <a:extLst>
               <a:ext uri="{FF2B5EF4-FFF2-40B4-BE49-F238E27FC236}">
-                <a16:creationId xmlns:a16="http://schemas.microsoft.com/office/drawing/2014/main" id="{7E4FD040-A3D1-4B76-8051-4FF75D79F6C4}"/>
+                <a16:creationId xmlns:a16="http://schemas.microsoft.com/office/drawing/2014/main" xmlns="" id="{7E4FD040-A3D1-4B76-8051-4FF75D79F6C4}"/>
               </a:ext>
             </a:extLst>
           </p:cNvPr>
@@ -8614,7 +8629,7 @@
           <p:cNvPr id="5" name="Picture 4">
             <a:extLst>
               <a:ext uri="{FF2B5EF4-FFF2-40B4-BE49-F238E27FC236}">
-                <a16:creationId xmlns:a16="http://schemas.microsoft.com/office/drawing/2014/main" id="{247980FC-C224-4514-901E-C9B97207D2FD}"/>
+                <a16:creationId xmlns:a16="http://schemas.microsoft.com/office/drawing/2014/main" xmlns="" id="{247980FC-C224-4514-901E-C9B97207D2FD}"/>
               </a:ext>
             </a:extLst>
           </p:cNvPr>
@@ -8650,7 +8665,7 @@
           <p:cNvPr id="6" name="TextBox 5">
             <a:extLst>
               <a:ext uri="{FF2B5EF4-FFF2-40B4-BE49-F238E27FC236}">
-                <a16:creationId xmlns:a16="http://schemas.microsoft.com/office/drawing/2014/main" id="{7FFE7E87-12A9-44B8-B6D2-87BF797DE487}"/>
+                <a16:creationId xmlns:a16="http://schemas.microsoft.com/office/drawing/2014/main" xmlns="" id="{7FFE7E87-12A9-44B8-B6D2-87BF797DE487}"/>
               </a:ext>
             </a:extLst>
           </p:cNvPr>
@@ -8771,7 +8786,7 @@
           <p:cNvPr id="2" name="TextBox 1">
             <a:extLst>
               <a:ext uri="{FF2B5EF4-FFF2-40B4-BE49-F238E27FC236}">
-                <a16:creationId xmlns:a16="http://schemas.microsoft.com/office/drawing/2014/main" id="{79AFAFDD-C02B-4607-A351-DA70A2324FF1}"/>
+                <a16:creationId xmlns:a16="http://schemas.microsoft.com/office/drawing/2014/main" xmlns="" id="{79AFAFDD-C02B-4607-A351-DA70A2324FF1}"/>
               </a:ext>
             </a:extLst>
           </p:cNvPr>
@@ -8806,7 +8821,7 @@
           <p:cNvPr id="3" name="TextBox 2">
             <a:extLst>
               <a:ext uri="{FF2B5EF4-FFF2-40B4-BE49-F238E27FC236}">
-                <a16:creationId xmlns:a16="http://schemas.microsoft.com/office/drawing/2014/main" id="{08DB893F-338B-4F13-9E44-F3967F58E0B0}"/>
+                <a16:creationId xmlns:a16="http://schemas.microsoft.com/office/drawing/2014/main" xmlns="" id="{08DB893F-338B-4F13-9E44-F3967F58E0B0}"/>
               </a:ext>
             </a:extLst>
           </p:cNvPr>
@@ -8876,7 +8891,7 @@
           <p:cNvPr id="4" name="Picture 3">
             <a:extLst>
               <a:ext uri="{FF2B5EF4-FFF2-40B4-BE49-F238E27FC236}">
-                <a16:creationId xmlns:a16="http://schemas.microsoft.com/office/drawing/2014/main" id="{34D0DE42-2284-4BA0-9993-E885FC0F9DBD}"/>
+                <a16:creationId xmlns:a16="http://schemas.microsoft.com/office/drawing/2014/main" xmlns="" id="{34D0DE42-2284-4BA0-9993-E885FC0F9DBD}"/>
               </a:ext>
             </a:extLst>
           </p:cNvPr>
@@ -8920,6 +8935,857 @@
 </p:sld>
 </file>
 
+<file path=ppt/slides/slide15.xml><?xml version="1.0" encoding="utf-8"?>
+<p:sld xmlns:a="http://schemas.openxmlformats.org/drawingml/2006/main" xmlns:r="http://schemas.openxmlformats.org/officeDocument/2006/relationships" xmlns:p="http://schemas.openxmlformats.org/presentationml/2006/main">
+  <p:cSld>
+    <p:spTree>
+      <p:nvGrpSpPr>
+        <p:cNvPr id="1" name=""/>
+        <p:cNvGrpSpPr/>
+        <p:nvPr/>
+      </p:nvGrpSpPr>
+      <p:grpSpPr>
+        <a:xfrm>
+          <a:off x="0" y="0"/>
+          <a:ext cx="0" cy="0"/>
+          <a:chOff x="0" y="0"/>
+          <a:chExt cx="0" cy="0"/>
+        </a:xfrm>
+      </p:grpSpPr>
+      <p:sp>
+        <p:nvSpPr>
+          <p:cNvPr id="2" name="Title 1"/>
+          <p:cNvSpPr>
+            <a:spLocks noGrp="1"/>
+          </p:cNvSpPr>
+          <p:nvPr>
+            <p:ph type="title"/>
+          </p:nvPr>
+        </p:nvSpPr>
+        <p:spPr/>
+        <p:txBody>
+          <a:bodyPr>
+            <a:normAutofit/>
+          </a:bodyPr>
+          <a:lstStyle/>
+          <a:p>
+            <a:pPr algn="ctr"/>
+            <a:r>
+              <a:rPr lang="en-US" sz="3600" b="1" u="sng" dirty="0" smtClean="0"/>
+              <a:t>Path finding</a:t>
+            </a:r>
+            <a:endParaRPr lang="en-US" sz="3600" b="1" u="sng" dirty="0"/>
+          </a:p>
+        </p:txBody>
+      </p:sp>
+      <p:sp>
+        <p:nvSpPr>
+          <p:cNvPr id="3" name="Content Placeholder 2"/>
+          <p:cNvSpPr>
+            <a:spLocks noGrp="1"/>
+          </p:cNvSpPr>
+          <p:nvPr>
+            <p:ph idx="1"/>
+          </p:nvPr>
+        </p:nvSpPr>
+        <p:spPr>
+          <a:xfrm>
+            <a:off x="852487" y="1625600"/>
+            <a:ext cx="10515600" cy="2674938"/>
+          </a:xfrm>
+        </p:spPr>
+        <p:txBody>
+          <a:bodyPr>
+            <a:normAutofit/>
+          </a:bodyPr>
+          <a:lstStyle/>
+          <a:p>
+            <a:pPr marL="0" indent="0">
+              <a:buNone/>
+            </a:pPr>
+            <a:r>
+              <a:rPr lang="en-US" sz="2000" b="1" dirty="0" smtClean="0"/>
+              <a:t>Definition:</a:t>
+            </a:r>
+          </a:p>
+          <a:p>
+            <a:pPr marL="0" indent="0">
+              <a:buNone/>
+            </a:pPr>
+            <a:r>
+              <a:rPr lang="en-US" sz="2000" b="1" dirty="0"/>
+              <a:t>	</a:t>
+            </a:r>
+            <a:r>
+              <a:rPr lang="en-US" sz="2000" b="1" dirty="0" smtClean="0"/>
+              <a:t>“Pathfinding</a:t>
+            </a:r>
+            <a:r>
+              <a:rPr lang="en-US" sz="2000" dirty="0" smtClean="0"/>
+              <a:t> </a:t>
+            </a:r>
+            <a:r>
+              <a:rPr lang="en-US" sz="2000" dirty="0"/>
+              <a:t>refers to the process of finding a path </a:t>
+            </a:r>
+            <a:r>
+              <a:rPr lang="en-US" sz="2000" dirty="0" smtClean="0"/>
+              <a:t>from </a:t>
+            </a:r>
+            <a:r>
+              <a:rPr lang="en-US" sz="2000" dirty="0"/>
+              <a:t>one </a:t>
+            </a:r>
+            <a:r>
+              <a:rPr lang="en-US" sz="2000" dirty="0" smtClean="0"/>
+              <a:t>point (vertex) </a:t>
+            </a:r>
+            <a:r>
+              <a:rPr lang="en-US" sz="2000" dirty="0"/>
+              <a:t>to another in a </a:t>
+            </a:r>
+            <a:r>
+              <a:rPr lang="en-US" sz="2000" dirty="0" smtClean="0"/>
+              <a:t>graph.</a:t>
+            </a:r>
+            <a:r>
+              <a:rPr lang="en-US" sz="2000" b="1" dirty="0" smtClean="0"/>
+              <a:t>”</a:t>
+            </a:r>
+          </a:p>
+          <a:p>
+            <a:pPr marL="0" indent="0">
+              <a:buNone/>
+            </a:pPr>
+            <a:endParaRPr lang="en-US" sz="2000" b="1" dirty="0" smtClean="0"/>
+          </a:p>
+          <a:p>
+            <a:pPr marL="0" indent="0">
+              <a:buNone/>
+            </a:pPr>
+            <a:r>
+              <a:rPr lang="en-US" sz="2000" dirty="0"/>
+              <a:t>A </a:t>
+            </a:r>
+            <a:r>
+              <a:rPr lang="en-US" sz="2000" b="1" dirty="0"/>
+              <a:t>path</a:t>
+            </a:r>
+            <a:r>
+              <a:rPr lang="en-US" sz="2000" dirty="0"/>
+              <a:t> in a graph is a sequence of edges that connects a series of vertices.</a:t>
+            </a:r>
+          </a:p>
+          <a:p>
+            <a:pPr marL="0" indent="0">
+              <a:buNone/>
+            </a:pPr>
+            <a:r>
+              <a:rPr lang="en-US" sz="2000" dirty="0" smtClean="0"/>
+              <a:t>It </a:t>
+            </a:r>
+            <a:r>
+              <a:rPr lang="en-US" sz="2000" dirty="0"/>
+              <a:t>can be represented as a list of vertices starting from a source node and ending at a destination node, with each consecutive vertex connected by an edge</a:t>
+            </a:r>
+            <a:r>
+              <a:rPr lang="en-US" sz="2000" dirty="0" smtClean="0"/>
+              <a:t>.</a:t>
+            </a:r>
+            <a:endParaRPr lang="en-US" sz="2000" dirty="0"/>
+          </a:p>
+        </p:txBody>
+      </p:sp>
+      <p:pic>
+        <p:nvPicPr>
+          <p:cNvPr id="4" name="Picture 3"/>
+          <p:cNvPicPr>
+            <a:picLocks noChangeAspect="1"/>
+          </p:cNvPicPr>
+          <p:nvPr/>
+        </p:nvPicPr>
+        <p:blipFill rotWithShape="1">
+          <a:blip r:embed="rId2">
+            <a:extLst>
+              <a:ext uri="{28A0092B-C50C-407E-A947-70E740481C1C}">
+                <a14:useLocalDpi xmlns:a14="http://schemas.microsoft.com/office/drawing/2010/main" val="0"/>
+              </a:ext>
+            </a:extLst>
+          </a:blip>
+          <a:srcRect b="13698"/>
+          <a:stretch/>
+        </p:blipFill>
+        <p:spPr>
+          <a:xfrm>
+            <a:off x="3324222" y="4143374"/>
+            <a:ext cx="5423384" cy="2343151"/>
+          </a:xfrm>
+          <a:prstGeom prst="rect">
+            <a:avLst/>
+          </a:prstGeom>
+        </p:spPr>
+      </p:pic>
+    </p:spTree>
+    <p:extLst>
+      <p:ext uri="{BB962C8B-B14F-4D97-AF65-F5344CB8AC3E}">
+        <p14:creationId xmlns:p14="http://schemas.microsoft.com/office/powerpoint/2010/main" val="142484890"/>
+      </p:ext>
+    </p:extLst>
+  </p:cSld>
+  <p:clrMapOvr>
+    <a:masterClrMapping/>
+  </p:clrMapOvr>
+</p:sld>
+</file>
+
+<file path=ppt/slides/slide16.xml><?xml version="1.0" encoding="utf-8"?>
+<p:sld xmlns:a="http://schemas.openxmlformats.org/drawingml/2006/main" xmlns:r="http://schemas.openxmlformats.org/officeDocument/2006/relationships" xmlns:p="http://schemas.openxmlformats.org/presentationml/2006/main">
+  <p:cSld>
+    <p:spTree>
+      <p:nvGrpSpPr>
+        <p:cNvPr id="1" name=""/>
+        <p:cNvGrpSpPr/>
+        <p:nvPr/>
+      </p:nvGrpSpPr>
+      <p:grpSpPr>
+        <a:xfrm>
+          <a:off x="0" y="0"/>
+          <a:ext cx="0" cy="0"/>
+          <a:chOff x="0" y="0"/>
+          <a:chExt cx="0" cy="0"/>
+        </a:xfrm>
+      </p:grpSpPr>
+      <p:sp>
+        <p:nvSpPr>
+          <p:cNvPr id="2" name="Title 1"/>
+          <p:cNvSpPr>
+            <a:spLocks noGrp="1"/>
+          </p:cNvSpPr>
+          <p:nvPr>
+            <p:ph type="title"/>
+          </p:nvPr>
+        </p:nvSpPr>
+        <p:spPr/>
+        <p:txBody>
+          <a:bodyPr>
+            <a:normAutofit/>
+          </a:bodyPr>
+          <a:lstStyle/>
+          <a:p>
+            <a:pPr algn="ctr"/>
+            <a:r>
+              <a:rPr lang="en-US" sz="3600" b="1" u="sng" dirty="0" smtClean="0"/>
+              <a:t>Shortest Path</a:t>
+            </a:r>
+            <a:endParaRPr lang="en-US" sz="3600" b="1" u="sng" dirty="0"/>
+          </a:p>
+        </p:txBody>
+      </p:sp>
+      <p:sp>
+        <p:nvSpPr>
+          <p:cNvPr id="3" name="Content Placeholder 2"/>
+          <p:cNvSpPr>
+            <a:spLocks noGrp="1"/>
+          </p:cNvSpPr>
+          <p:nvPr>
+            <p:ph idx="1"/>
+          </p:nvPr>
+        </p:nvSpPr>
+        <p:spPr>
+          <a:xfrm>
+            <a:off x="852488" y="1673203"/>
+            <a:ext cx="10515600" cy="2317750"/>
+          </a:xfrm>
+        </p:spPr>
+        <p:txBody>
+          <a:bodyPr>
+            <a:normAutofit/>
+          </a:bodyPr>
+          <a:lstStyle/>
+          <a:p>
+            <a:pPr marL="0" indent="0">
+              <a:buNone/>
+            </a:pPr>
+            <a:r>
+              <a:rPr lang="en-US" sz="2000" b="1" dirty="0" smtClean="0"/>
+              <a:t>Definition:</a:t>
+            </a:r>
+          </a:p>
+          <a:p>
+            <a:pPr marL="0" indent="0">
+              <a:buNone/>
+            </a:pPr>
+            <a:r>
+              <a:rPr lang="en-US" sz="2000" dirty="0" smtClean="0"/>
+              <a:t>	“The </a:t>
+            </a:r>
+            <a:r>
+              <a:rPr lang="en-US" sz="2000" b="1" dirty="0"/>
+              <a:t>shortest path</a:t>
+            </a:r>
+            <a:r>
+              <a:rPr lang="en-US" sz="2000" dirty="0"/>
+              <a:t> is a path between two vertices such that the sum of the weights of the edges in the path is minimized</a:t>
+            </a:r>
+            <a:r>
+              <a:rPr lang="en-US" sz="2000" dirty="0" smtClean="0"/>
+              <a:t>.”</a:t>
+            </a:r>
+          </a:p>
+          <a:p>
+            <a:pPr marL="0" indent="0">
+              <a:buNone/>
+            </a:pPr>
+            <a:endParaRPr lang="en-US" sz="2000" dirty="0" smtClean="0"/>
+          </a:p>
+          <a:p>
+            <a:pPr marL="0" indent="0">
+              <a:buNone/>
+            </a:pPr>
+            <a:r>
+              <a:rPr lang="en-US" sz="2000" dirty="0" smtClean="0"/>
+              <a:t>In </a:t>
+            </a:r>
+            <a:r>
+              <a:rPr lang="en-US" sz="2000" dirty="0"/>
+              <a:t>unweighted graphs, the shortest path is simply the path with the least number of </a:t>
+            </a:r>
+            <a:r>
+              <a:rPr lang="en-US" sz="2000" dirty="0" smtClean="0"/>
+              <a:t>edges.</a:t>
+            </a:r>
+          </a:p>
+          <a:p>
+            <a:pPr marL="0" indent="0">
+              <a:buNone/>
+            </a:pPr>
+            <a:r>
+              <a:rPr lang="en-US" sz="2000" dirty="0" smtClean="0"/>
+              <a:t>In </a:t>
+            </a:r>
+            <a:r>
+              <a:rPr lang="en-US" sz="2000" dirty="0"/>
+              <a:t>weighted graphs, it’s the path with the minimum total weight.</a:t>
+            </a:r>
+          </a:p>
+        </p:txBody>
+      </p:sp>
+      <p:pic>
+        <p:nvPicPr>
+          <p:cNvPr id="4" name="Picture 3"/>
+          <p:cNvPicPr>
+            <a:picLocks noChangeAspect="1"/>
+          </p:cNvPicPr>
+          <p:nvPr/>
+        </p:nvPicPr>
+        <p:blipFill>
+          <a:blip r:embed="rId2">
+            <a:extLst>
+              <a:ext uri="{28A0092B-C50C-407E-A947-70E740481C1C}">
+                <a14:useLocalDpi xmlns:a14="http://schemas.microsoft.com/office/drawing/2010/main" val="0"/>
+              </a:ext>
+            </a:extLst>
+          </a:blip>
+          <a:stretch>
+            <a:fillRect/>
+          </a:stretch>
+        </p:blipFill>
+        <p:spPr>
+          <a:xfrm>
+            <a:off x="1119168" y="3890937"/>
+            <a:ext cx="4865672" cy="2709885"/>
+          </a:xfrm>
+          <a:prstGeom prst="rect">
+            <a:avLst/>
+          </a:prstGeom>
+        </p:spPr>
+      </p:pic>
+      <p:pic>
+        <p:nvPicPr>
+          <p:cNvPr id="5" name="Picture 4"/>
+          <p:cNvPicPr>
+            <a:picLocks noChangeAspect="1"/>
+          </p:cNvPicPr>
+          <p:nvPr/>
+        </p:nvPicPr>
+        <p:blipFill>
+          <a:blip r:embed="rId3">
+            <a:extLst>
+              <a:ext uri="{28A0092B-C50C-407E-A947-70E740481C1C}">
+                <a14:useLocalDpi xmlns:a14="http://schemas.microsoft.com/office/drawing/2010/main" val="0"/>
+              </a:ext>
+            </a:extLst>
+          </a:blip>
+          <a:stretch>
+            <a:fillRect/>
+          </a:stretch>
+        </p:blipFill>
+        <p:spPr>
+          <a:xfrm>
+            <a:off x="6386513" y="4190985"/>
+            <a:ext cx="4226704" cy="2109788"/>
+          </a:xfrm>
+          <a:prstGeom prst="rect">
+            <a:avLst/>
+          </a:prstGeom>
+        </p:spPr>
+      </p:pic>
+    </p:spTree>
+    <p:extLst>
+      <p:ext uri="{BB962C8B-B14F-4D97-AF65-F5344CB8AC3E}">
+        <p14:creationId xmlns:p14="http://schemas.microsoft.com/office/powerpoint/2010/main" val="1626842515"/>
+      </p:ext>
+    </p:extLst>
+  </p:cSld>
+  <p:clrMapOvr>
+    <a:masterClrMapping/>
+  </p:clrMapOvr>
+</p:sld>
+</file>
+
+<file path=ppt/slides/slide17.xml><?xml version="1.0" encoding="utf-8"?>
+<p:sld xmlns:a="http://schemas.openxmlformats.org/drawingml/2006/main" xmlns:r="http://schemas.openxmlformats.org/officeDocument/2006/relationships" xmlns:p="http://schemas.openxmlformats.org/presentationml/2006/main">
+  <p:cSld>
+    <p:spTree>
+      <p:nvGrpSpPr>
+        <p:cNvPr id="1" name=""/>
+        <p:cNvGrpSpPr/>
+        <p:nvPr/>
+      </p:nvGrpSpPr>
+      <p:grpSpPr>
+        <a:xfrm>
+          <a:off x="0" y="0"/>
+          <a:ext cx="0" cy="0"/>
+          <a:chOff x="0" y="0"/>
+          <a:chExt cx="0" cy="0"/>
+        </a:xfrm>
+      </p:grpSpPr>
+      <p:sp>
+        <p:nvSpPr>
+          <p:cNvPr id="2" name="Title 1"/>
+          <p:cNvSpPr>
+            <a:spLocks noGrp="1"/>
+          </p:cNvSpPr>
+          <p:nvPr>
+            <p:ph type="title"/>
+          </p:nvPr>
+        </p:nvSpPr>
+        <p:spPr/>
+        <p:txBody>
+          <a:bodyPr>
+            <a:normAutofit/>
+          </a:bodyPr>
+          <a:lstStyle/>
+          <a:p>
+            <a:pPr algn="ctr"/>
+            <a:r>
+              <a:rPr lang="en-US" sz="3200" b="1" u="sng" dirty="0" smtClean="0"/>
+              <a:t>Some Algorithms Used for Path Finding</a:t>
+            </a:r>
+            <a:endParaRPr lang="en-US" sz="3200" b="1" u="sng" dirty="0"/>
+          </a:p>
+        </p:txBody>
+      </p:sp>
+      <p:sp>
+        <p:nvSpPr>
+          <p:cNvPr id="3" name="Content Placeholder 2"/>
+          <p:cNvSpPr>
+            <a:spLocks noGrp="1"/>
+          </p:cNvSpPr>
+          <p:nvPr>
+            <p:ph idx="1"/>
+          </p:nvPr>
+        </p:nvSpPr>
+        <p:spPr>
+          <a:xfrm>
+            <a:off x="838199" y="1911350"/>
+            <a:ext cx="10515600" cy="3846513"/>
+          </a:xfrm>
+        </p:spPr>
+        <p:txBody>
+          <a:bodyPr>
+            <a:normAutofit/>
+          </a:bodyPr>
+          <a:lstStyle/>
+          <a:p>
+            <a:pPr algn="ctr"/>
+            <a:r>
+              <a:rPr lang="en-US" sz="2000" dirty="0"/>
+              <a:t>Dijkstra’s </a:t>
+            </a:r>
+            <a:r>
+              <a:rPr lang="en-US" sz="2000" dirty="0" smtClean="0"/>
+              <a:t>Algorithm</a:t>
+            </a:r>
+          </a:p>
+          <a:p>
+            <a:pPr algn="ctr"/>
+            <a:r>
+              <a:rPr lang="en-US" sz="2000" dirty="0" smtClean="0"/>
+              <a:t>A</a:t>
+            </a:r>
+            <a:r>
+              <a:rPr lang="en-US" sz="2000" dirty="0"/>
+              <a:t>* </a:t>
+            </a:r>
+            <a:r>
+              <a:rPr lang="en-US" sz="2000" dirty="0" smtClean="0"/>
+              <a:t>Algorithm</a:t>
+            </a:r>
+          </a:p>
+          <a:p>
+            <a:pPr algn="ctr"/>
+            <a:r>
+              <a:rPr lang="en-US" sz="2000" dirty="0" smtClean="0"/>
+              <a:t>Bellman-Ford Algorithm</a:t>
+            </a:r>
+          </a:p>
+          <a:p>
+            <a:pPr algn="ctr"/>
+            <a:r>
+              <a:rPr lang="en-US" sz="2000" dirty="0" smtClean="0"/>
+              <a:t>Floyd-</a:t>
+            </a:r>
+            <a:r>
+              <a:rPr lang="en-US" sz="2000" dirty="0" err="1" smtClean="0"/>
+              <a:t>Warshall</a:t>
+            </a:r>
+            <a:r>
+              <a:rPr lang="en-US" sz="2000" dirty="0" smtClean="0"/>
+              <a:t> Algorithm</a:t>
+            </a:r>
+          </a:p>
+          <a:p>
+            <a:pPr algn="ctr"/>
+            <a:r>
+              <a:rPr lang="en-US" sz="2000" dirty="0" smtClean="0"/>
+              <a:t>Breadth-First </a:t>
+            </a:r>
+            <a:r>
+              <a:rPr lang="en-US" sz="2000" dirty="0"/>
+              <a:t>Search (</a:t>
+            </a:r>
+            <a:r>
+              <a:rPr lang="en-US" sz="2000" dirty="0" smtClean="0"/>
+              <a:t>BFS)</a:t>
+            </a:r>
+          </a:p>
+          <a:p>
+            <a:pPr algn="ctr"/>
+            <a:r>
+              <a:rPr lang="en-US" sz="2000" dirty="0" smtClean="0"/>
+              <a:t>Depth-First </a:t>
+            </a:r>
+            <a:r>
+              <a:rPr lang="en-US" sz="2000" dirty="0"/>
+              <a:t>Search (</a:t>
+            </a:r>
+            <a:r>
+              <a:rPr lang="en-US" sz="2000" dirty="0" smtClean="0"/>
+              <a:t>DFS)</a:t>
+            </a:r>
+          </a:p>
+          <a:p>
+            <a:pPr algn="ctr"/>
+            <a:r>
+              <a:rPr lang="en-US" sz="2000" dirty="0" smtClean="0"/>
+              <a:t>Johnson’s Algorithm</a:t>
+            </a:r>
+          </a:p>
+        </p:txBody>
+      </p:sp>
+    </p:spTree>
+    <p:extLst>
+      <p:ext uri="{BB962C8B-B14F-4D97-AF65-F5344CB8AC3E}">
+        <p14:creationId xmlns:p14="http://schemas.microsoft.com/office/powerpoint/2010/main" val="2745718031"/>
+      </p:ext>
+    </p:extLst>
+  </p:cSld>
+  <p:clrMapOvr>
+    <a:masterClrMapping/>
+  </p:clrMapOvr>
+</p:sld>
+</file>
+
+<file path=ppt/slides/slide18.xml><?xml version="1.0" encoding="utf-8"?>
+<p:sld xmlns:a="http://schemas.openxmlformats.org/drawingml/2006/main" xmlns:r="http://schemas.openxmlformats.org/officeDocument/2006/relationships" xmlns:p="http://schemas.openxmlformats.org/presentationml/2006/main">
+  <p:cSld>
+    <p:spTree>
+      <p:nvGrpSpPr>
+        <p:cNvPr id="1" name=""/>
+        <p:cNvGrpSpPr/>
+        <p:nvPr/>
+      </p:nvGrpSpPr>
+      <p:grpSpPr>
+        <a:xfrm>
+          <a:off x="0" y="0"/>
+          <a:ext cx="0" cy="0"/>
+          <a:chOff x="0" y="0"/>
+          <a:chExt cx="0" cy="0"/>
+        </a:xfrm>
+      </p:grpSpPr>
+      <p:sp>
+        <p:nvSpPr>
+          <p:cNvPr id="2" name="Title 1"/>
+          <p:cNvSpPr>
+            <a:spLocks noGrp="1"/>
+          </p:cNvSpPr>
+          <p:nvPr>
+            <p:ph type="title"/>
+          </p:nvPr>
+        </p:nvSpPr>
+        <p:spPr/>
+        <p:txBody>
+          <a:bodyPr>
+            <a:normAutofit/>
+          </a:bodyPr>
+          <a:lstStyle/>
+          <a:p>
+            <a:pPr algn="ctr"/>
+            <a:r>
+              <a:rPr lang="en-US" sz="3200" b="1" u="sng" dirty="0" smtClean="0"/>
+              <a:t>Some Algorithms Used for Path Finding</a:t>
+            </a:r>
+            <a:endParaRPr lang="en-US" sz="3200" b="1" u="sng" dirty="0"/>
+          </a:p>
+        </p:txBody>
+      </p:sp>
+      <p:sp>
+        <p:nvSpPr>
+          <p:cNvPr id="3" name="Content Placeholder 2"/>
+          <p:cNvSpPr>
+            <a:spLocks noGrp="1"/>
+          </p:cNvSpPr>
+          <p:nvPr>
+            <p:ph idx="1"/>
+          </p:nvPr>
+        </p:nvSpPr>
+        <p:spPr>
+          <a:xfrm>
+            <a:off x="838199" y="1911350"/>
+            <a:ext cx="10515600" cy="3846513"/>
+          </a:xfrm>
+        </p:spPr>
+        <p:txBody>
+          <a:bodyPr>
+            <a:normAutofit/>
+          </a:bodyPr>
+          <a:lstStyle/>
+          <a:p>
+            <a:pPr algn="ctr"/>
+            <a:r>
+              <a:rPr lang="en-US" sz="2000" dirty="0"/>
+              <a:t>Dijkstra’s </a:t>
+            </a:r>
+            <a:r>
+              <a:rPr lang="en-US" sz="2000" dirty="0" smtClean="0"/>
+              <a:t>Algorithm</a:t>
+            </a:r>
+          </a:p>
+          <a:p>
+            <a:pPr algn="ctr"/>
+            <a:r>
+              <a:rPr lang="en-US" sz="2000" dirty="0" smtClean="0"/>
+              <a:t>A</a:t>
+            </a:r>
+            <a:r>
+              <a:rPr lang="en-US" sz="2000" dirty="0"/>
+              <a:t>* </a:t>
+            </a:r>
+            <a:r>
+              <a:rPr lang="en-US" sz="2000" dirty="0" smtClean="0"/>
+              <a:t>Algorithm</a:t>
+            </a:r>
+          </a:p>
+          <a:p>
+            <a:pPr algn="ctr"/>
+            <a:r>
+              <a:rPr lang="en-US" sz="2000" dirty="0" smtClean="0"/>
+              <a:t>Bellman-Ford Algorithm</a:t>
+            </a:r>
+          </a:p>
+          <a:p>
+            <a:pPr algn="ctr"/>
+            <a:r>
+              <a:rPr lang="en-US" sz="2000" dirty="0" smtClean="0"/>
+              <a:t>Floyd-</a:t>
+            </a:r>
+            <a:r>
+              <a:rPr lang="en-US" sz="2000" dirty="0" err="1" smtClean="0"/>
+              <a:t>Warshall</a:t>
+            </a:r>
+            <a:r>
+              <a:rPr lang="en-US" sz="2000" dirty="0" smtClean="0"/>
+              <a:t> Algorithm</a:t>
+            </a:r>
+          </a:p>
+          <a:p>
+            <a:pPr algn="ctr"/>
+            <a:r>
+              <a:rPr lang="en-US" sz="2000" dirty="0" smtClean="0"/>
+              <a:t>Breadth-First </a:t>
+            </a:r>
+            <a:r>
+              <a:rPr lang="en-US" sz="2000" dirty="0"/>
+              <a:t>Search (</a:t>
+            </a:r>
+            <a:r>
+              <a:rPr lang="en-US" sz="2000" dirty="0" smtClean="0"/>
+              <a:t>BFS)</a:t>
+            </a:r>
+          </a:p>
+          <a:p>
+            <a:pPr algn="ctr"/>
+            <a:r>
+              <a:rPr lang="en-US" sz="2000" dirty="0" smtClean="0"/>
+              <a:t>Depth-First </a:t>
+            </a:r>
+            <a:r>
+              <a:rPr lang="en-US" sz="2000" dirty="0"/>
+              <a:t>Search (</a:t>
+            </a:r>
+            <a:r>
+              <a:rPr lang="en-US" sz="2000" dirty="0" smtClean="0"/>
+              <a:t>DFS)</a:t>
+            </a:r>
+          </a:p>
+          <a:p>
+            <a:pPr algn="ctr"/>
+            <a:r>
+              <a:rPr lang="en-US" sz="2000" dirty="0" smtClean="0"/>
+              <a:t>Johnson’s Algorithm</a:t>
+            </a:r>
+          </a:p>
+          <a:p>
+            <a:pPr marL="0" indent="0" algn="ctr">
+              <a:buNone/>
+            </a:pPr>
+            <a:endParaRPr lang="en-US" sz="2000" dirty="0" smtClean="0"/>
+          </a:p>
+          <a:p>
+            <a:pPr marL="0" indent="0" algn="ctr">
+              <a:buNone/>
+            </a:pPr>
+            <a:r>
+              <a:rPr lang="en-US" sz="2000" dirty="0"/>
+              <a:t>We have used Breadth-First Search (BFS) in our </a:t>
+            </a:r>
+            <a:r>
+              <a:rPr lang="en-US" sz="2000" dirty="0" smtClean="0"/>
+              <a:t>code..</a:t>
+            </a:r>
+            <a:endParaRPr lang="en-US" sz="2000" dirty="0"/>
+          </a:p>
+        </p:txBody>
+      </p:sp>
+    </p:spTree>
+    <p:extLst>
+      <p:ext uri="{BB962C8B-B14F-4D97-AF65-F5344CB8AC3E}">
+        <p14:creationId xmlns:p14="http://schemas.microsoft.com/office/powerpoint/2010/main" val="1758734204"/>
+      </p:ext>
+    </p:extLst>
+  </p:cSld>
+  <p:clrMapOvr>
+    <a:masterClrMapping/>
+  </p:clrMapOvr>
+</p:sld>
+</file>
+
+<file path=ppt/slides/slide19.xml><?xml version="1.0" encoding="utf-8"?>
+<p:sld xmlns:a="http://schemas.openxmlformats.org/drawingml/2006/main" xmlns:r="http://schemas.openxmlformats.org/officeDocument/2006/relationships" xmlns:p="http://schemas.openxmlformats.org/presentationml/2006/main">
+  <p:cSld>
+    <p:spTree>
+      <p:nvGrpSpPr>
+        <p:cNvPr id="1" name=""/>
+        <p:cNvGrpSpPr/>
+        <p:nvPr/>
+      </p:nvGrpSpPr>
+      <p:grpSpPr>
+        <a:xfrm>
+          <a:off x="0" y="0"/>
+          <a:ext cx="0" cy="0"/>
+          <a:chOff x="0" y="0"/>
+          <a:chExt cx="0" cy="0"/>
+        </a:xfrm>
+      </p:grpSpPr>
+      <p:sp>
+        <p:nvSpPr>
+          <p:cNvPr id="2" name="Title 1"/>
+          <p:cNvSpPr>
+            <a:spLocks noGrp="1"/>
+          </p:cNvSpPr>
+          <p:nvPr>
+            <p:ph type="title"/>
+          </p:nvPr>
+        </p:nvSpPr>
+        <p:spPr/>
+        <p:txBody>
+          <a:bodyPr>
+            <a:normAutofit/>
+          </a:bodyPr>
+          <a:lstStyle/>
+          <a:p>
+            <a:pPr algn="ctr"/>
+            <a:r>
+              <a:rPr lang="en-US" sz="3600" b="1" u="sng" dirty="0" smtClean="0"/>
+              <a:t>Breadth-First Search Algorithm</a:t>
+            </a:r>
+            <a:endParaRPr lang="en-US" sz="3600" b="1" u="sng" dirty="0"/>
+          </a:p>
+        </p:txBody>
+      </p:sp>
+      <p:sp>
+        <p:nvSpPr>
+          <p:cNvPr id="3" name="Content Placeholder 2"/>
+          <p:cNvSpPr>
+            <a:spLocks noGrp="1"/>
+          </p:cNvSpPr>
+          <p:nvPr>
+            <p:ph idx="1"/>
+          </p:nvPr>
+        </p:nvSpPr>
+        <p:spPr/>
+        <p:txBody>
+          <a:bodyPr/>
+          <a:lstStyle/>
+          <a:p>
+            <a:pPr marL="0" indent="0">
+              <a:buNone/>
+            </a:pPr>
+            <a:r>
+              <a:rPr lang="en-US" dirty="0" smtClean="0"/>
+              <a:t>BFS is the best algorithm used for path finding in </a:t>
+            </a:r>
+            <a:r>
+              <a:rPr lang="en-US" b="1" dirty="0" smtClean="0"/>
+              <a:t>unweighted graphs</a:t>
+            </a:r>
+            <a:r>
+              <a:rPr lang="en-US" dirty="0" smtClean="0"/>
+              <a:t>.</a:t>
+            </a:r>
+          </a:p>
+          <a:p>
+            <a:pPr marL="0" indent="0">
+              <a:buNone/>
+            </a:pPr>
+            <a:endParaRPr lang="en-US" dirty="0"/>
+          </a:p>
+        </p:txBody>
+      </p:sp>
+    </p:spTree>
+    <p:extLst>
+      <p:ext uri="{BB962C8B-B14F-4D97-AF65-F5344CB8AC3E}">
+        <p14:creationId xmlns:p14="http://schemas.microsoft.com/office/powerpoint/2010/main" val="3891699235"/>
+      </p:ext>
+    </p:extLst>
+  </p:cSld>
+  <p:clrMapOvr>
+    <a:masterClrMapping/>
+  </p:clrMapOvr>
+</p:sld>
+</file>
+
 <file path=ppt/slides/slide2.xml><?xml version="1.0" encoding="utf-8"?>
 <p:sld xmlns:a="http://schemas.openxmlformats.org/drawingml/2006/main" xmlns:r="http://schemas.openxmlformats.org/officeDocument/2006/relationships" xmlns:p="http://schemas.openxmlformats.org/presentationml/2006/main">
   <p:cSld>
@@ -8942,7 +9808,7 @@
           <p:cNvPr id="2" name="Title 1">
             <a:extLst>
               <a:ext uri="{FF2B5EF4-FFF2-40B4-BE49-F238E27FC236}">
-                <a16:creationId xmlns:a16="http://schemas.microsoft.com/office/drawing/2014/main" id="{5D30DDF8-853A-DFDB-A947-FE9D44C8E03C}"/>
+                <a16:creationId xmlns:a16="http://schemas.microsoft.com/office/drawing/2014/main" xmlns="" id="{5D30DDF8-853A-DFDB-A947-FE9D44C8E03C}"/>
               </a:ext>
             </a:extLst>
           </p:cNvPr>
@@ -8999,7 +9865,7 @@
           <p:cNvPr id="3" name="Text Placeholder 2">
             <a:extLst>
               <a:ext uri="{FF2B5EF4-FFF2-40B4-BE49-F238E27FC236}">
-                <a16:creationId xmlns:a16="http://schemas.microsoft.com/office/drawing/2014/main" id="{F3FFBF10-3A6A-039D-96F3-6E61CA66CD1E}"/>
+                <a16:creationId xmlns:a16="http://schemas.microsoft.com/office/drawing/2014/main" xmlns="" id="{F3FFBF10-3A6A-039D-96F3-6E61CA66CD1E}"/>
               </a:ext>
             </a:extLst>
           </p:cNvPr>
@@ -9065,7 +9931,7 @@
           <p:cNvPr id="5" name="Picture 4">
             <a:extLst>
               <a:ext uri="{FF2B5EF4-FFF2-40B4-BE49-F238E27FC236}">
-                <a16:creationId xmlns:a16="http://schemas.microsoft.com/office/drawing/2014/main" id="{DF5E120D-8E2E-D414-9BE3-A68A099B210E}"/>
+                <a16:creationId xmlns:a16="http://schemas.microsoft.com/office/drawing/2014/main" xmlns="" id="{DF5E120D-8E2E-D414-9BE3-A68A099B210E}"/>
               </a:ext>
             </a:extLst>
           </p:cNvPr>
@@ -9100,7 +9966,7 @@
           <p:cNvPr id="7" name="Picture 6">
             <a:extLst>
               <a:ext uri="{FF2B5EF4-FFF2-40B4-BE49-F238E27FC236}">
-                <a16:creationId xmlns:a16="http://schemas.microsoft.com/office/drawing/2014/main" id="{5EC6C3A6-23EE-3547-4CDC-5D24A0A7D522}"/>
+                <a16:creationId xmlns:a16="http://schemas.microsoft.com/office/drawing/2014/main" xmlns="" id="{5EC6C3A6-23EE-3547-4CDC-5D24A0A7D522}"/>
               </a:ext>
             </a:extLst>
           </p:cNvPr>
@@ -9135,7 +10001,7 @@
           <p:cNvPr id="9" name="Picture 8">
             <a:extLst>
               <a:ext uri="{FF2B5EF4-FFF2-40B4-BE49-F238E27FC236}">
-                <a16:creationId xmlns:a16="http://schemas.microsoft.com/office/drawing/2014/main" id="{BCAA92A2-3C81-650B-7F86-D978F3483C08}"/>
+                <a16:creationId xmlns:a16="http://schemas.microsoft.com/office/drawing/2014/main" xmlns="" id="{BCAA92A2-3C81-650B-7F86-D978F3483C08}"/>
               </a:ext>
             </a:extLst>
           </p:cNvPr>
@@ -9200,7 +10066,7 @@
           <p:cNvPr id="2" name="Title 1">
             <a:extLst>
               <a:ext uri="{FF2B5EF4-FFF2-40B4-BE49-F238E27FC236}">
-                <a16:creationId xmlns:a16="http://schemas.microsoft.com/office/drawing/2014/main" id="{5D30DDF8-853A-DFDB-A947-FE9D44C8E03C}"/>
+                <a16:creationId xmlns:a16="http://schemas.microsoft.com/office/drawing/2014/main" xmlns="" id="{5D30DDF8-853A-DFDB-A947-FE9D44C8E03C}"/>
               </a:ext>
             </a:extLst>
           </p:cNvPr>
@@ -9257,7 +10123,7 @@
           <p:cNvPr id="3" name="Text Placeholder 2">
             <a:extLst>
               <a:ext uri="{FF2B5EF4-FFF2-40B4-BE49-F238E27FC236}">
-                <a16:creationId xmlns:a16="http://schemas.microsoft.com/office/drawing/2014/main" id="{F3FFBF10-3A6A-039D-96F3-6E61CA66CD1E}"/>
+                <a16:creationId xmlns:a16="http://schemas.microsoft.com/office/drawing/2014/main" xmlns="" id="{F3FFBF10-3A6A-039D-96F3-6E61CA66CD1E}"/>
               </a:ext>
             </a:extLst>
           </p:cNvPr>
@@ -9323,7 +10189,7 @@
           <p:cNvPr id="5" name="Picture 4">
             <a:extLst>
               <a:ext uri="{FF2B5EF4-FFF2-40B4-BE49-F238E27FC236}">
-                <a16:creationId xmlns:a16="http://schemas.microsoft.com/office/drawing/2014/main" id="{DF5E120D-8E2E-D414-9BE3-A68A099B210E}"/>
+                <a16:creationId xmlns:a16="http://schemas.microsoft.com/office/drawing/2014/main" xmlns="" id="{DF5E120D-8E2E-D414-9BE3-A68A099B210E}"/>
               </a:ext>
             </a:extLst>
           </p:cNvPr>
@@ -9358,7 +10224,7 @@
           <p:cNvPr id="7" name="Picture 6">
             <a:extLst>
               <a:ext uri="{FF2B5EF4-FFF2-40B4-BE49-F238E27FC236}">
-                <a16:creationId xmlns:a16="http://schemas.microsoft.com/office/drawing/2014/main" id="{5EC6C3A6-23EE-3547-4CDC-5D24A0A7D522}"/>
+                <a16:creationId xmlns:a16="http://schemas.microsoft.com/office/drawing/2014/main" xmlns="" id="{5EC6C3A6-23EE-3547-4CDC-5D24A0A7D522}"/>
               </a:ext>
             </a:extLst>
           </p:cNvPr>
@@ -9393,7 +10259,7 @@
           <p:cNvPr id="9" name="Picture 8">
             <a:extLst>
               <a:ext uri="{FF2B5EF4-FFF2-40B4-BE49-F238E27FC236}">
-                <a16:creationId xmlns:a16="http://schemas.microsoft.com/office/drawing/2014/main" id="{BCAA92A2-3C81-650B-7F86-D978F3483C08}"/>
+                <a16:creationId xmlns:a16="http://schemas.microsoft.com/office/drawing/2014/main" xmlns="" id="{BCAA92A2-3C81-650B-7F86-D978F3483C08}"/>
               </a:ext>
             </a:extLst>
           </p:cNvPr>
@@ -9428,7 +10294,7 @@
           <p:cNvPr id="13" name="Straight Arrow Connector 12">
             <a:extLst>
               <a:ext uri="{FF2B5EF4-FFF2-40B4-BE49-F238E27FC236}">
-                <a16:creationId xmlns:a16="http://schemas.microsoft.com/office/drawing/2014/main" id="{0CF5CAB6-3C22-9FEC-7E1E-7B91C8E5761F}"/>
+                <a16:creationId xmlns:a16="http://schemas.microsoft.com/office/drawing/2014/main" xmlns="" id="{0CF5CAB6-3C22-9FEC-7E1E-7B91C8E5761F}"/>
               </a:ext>
             </a:extLst>
           </p:cNvPr>
@@ -9472,7 +10338,7 @@
           <p:cNvPr id="14" name="Straight Arrow Connector 13">
             <a:extLst>
               <a:ext uri="{FF2B5EF4-FFF2-40B4-BE49-F238E27FC236}">
-                <a16:creationId xmlns:a16="http://schemas.microsoft.com/office/drawing/2014/main" id="{1CCF16B9-A09E-4470-2324-7D202860F263}"/>
+                <a16:creationId xmlns:a16="http://schemas.microsoft.com/office/drawing/2014/main" xmlns="" id="{1CCF16B9-A09E-4470-2324-7D202860F263}"/>
               </a:ext>
             </a:extLst>
           </p:cNvPr>
@@ -9519,7 +10385,7 @@
           <p:cNvPr id="4" name="Straight Arrow Connector 3">
             <a:extLst>
               <a:ext uri="{FF2B5EF4-FFF2-40B4-BE49-F238E27FC236}">
-                <a16:creationId xmlns:a16="http://schemas.microsoft.com/office/drawing/2014/main" id="{98ADD665-6FC6-CEB4-6D76-8C26111BF116}"/>
+                <a16:creationId xmlns:a16="http://schemas.microsoft.com/office/drawing/2014/main" xmlns="" id="{98ADD665-6FC6-CEB4-6D76-8C26111BF116}"/>
               </a:ext>
             </a:extLst>
           </p:cNvPr>
@@ -9563,7 +10429,7 @@
           <p:cNvPr id="6" name="Straight Arrow Connector 5">
             <a:extLst>
               <a:ext uri="{FF2B5EF4-FFF2-40B4-BE49-F238E27FC236}">
-                <a16:creationId xmlns:a16="http://schemas.microsoft.com/office/drawing/2014/main" id="{3C0F131E-E90A-3652-2E94-739BA4B3AD14}"/>
+                <a16:creationId xmlns:a16="http://schemas.microsoft.com/office/drawing/2014/main" xmlns="" id="{3C0F131E-E90A-3652-2E94-739BA4B3AD14}"/>
               </a:ext>
             </a:extLst>
           </p:cNvPr>
@@ -9607,7 +10473,7 @@
           <p:cNvPr id="8" name="Straight Arrow Connector 7">
             <a:extLst>
               <a:ext uri="{FF2B5EF4-FFF2-40B4-BE49-F238E27FC236}">
-                <a16:creationId xmlns:a16="http://schemas.microsoft.com/office/drawing/2014/main" id="{953C8946-F2DA-9D06-E8E1-65ED0C5F25D8}"/>
+                <a16:creationId xmlns:a16="http://schemas.microsoft.com/office/drawing/2014/main" xmlns="" id="{953C8946-F2DA-9D06-E8E1-65ED0C5F25D8}"/>
               </a:ext>
             </a:extLst>
           </p:cNvPr>
@@ -9654,7 +10520,7 @@
           <p:cNvPr id="10" name="Straight Arrow Connector 9">
             <a:extLst>
               <a:ext uri="{FF2B5EF4-FFF2-40B4-BE49-F238E27FC236}">
-                <a16:creationId xmlns:a16="http://schemas.microsoft.com/office/drawing/2014/main" id="{73A92731-B2F7-2195-B2DA-1A6401977BE5}"/>
+                <a16:creationId xmlns:a16="http://schemas.microsoft.com/office/drawing/2014/main" xmlns="" id="{73A92731-B2F7-2195-B2DA-1A6401977BE5}"/>
               </a:ext>
             </a:extLst>
           </p:cNvPr>
@@ -9701,7 +10567,7 @@
           <p:cNvPr id="11" name="TextBox 10">
             <a:extLst>
               <a:ext uri="{FF2B5EF4-FFF2-40B4-BE49-F238E27FC236}">
-                <a16:creationId xmlns:a16="http://schemas.microsoft.com/office/drawing/2014/main" id="{25E40C69-AAB7-773A-3E63-8815E4C667BB}"/>
+                <a16:creationId xmlns:a16="http://schemas.microsoft.com/office/drawing/2014/main" xmlns="" id="{25E40C69-AAB7-773A-3E63-8815E4C667BB}"/>
               </a:ext>
             </a:extLst>
           </p:cNvPr>
@@ -9742,7 +10608,7 @@
           <p:cNvPr id="12" name="TextBox 11">
             <a:extLst>
               <a:ext uri="{FF2B5EF4-FFF2-40B4-BE49-F238E27FC236}">
-                <a16:creationId xmlns:a16="http://schemas.microsoft.com/office/drawing/2014/main" id="{C2D554D5-ACAF-44BE-A0AE-5FAD5C39073F}"/>
+                <a16:creationId xmlns:a16="http://schemas.microsoft.com/office/drawing/2014/main" xmlns="" id="{C2D554D5-ACAF-44BE-A0AE-5FAD5C39073F}"/>
               </a:ext>
             </a:extLst>
           </p:cNvPr>
@@ -9813,7 +10679,7 @@
           <p:cNvPr id="2" name="Title 1">
             <a:extLst>
               <a:ext uri="{FF2B5EF4-FFF2-40B4-BE49-F238E27FC236}">
-                <a16:creationId xmlns:a16="http://schemas.microsoft.com/office/drawing/2014/main" id="{5D30DDF8-853A-DFDB-A947-FE9D44C8E03C}"/>
+                <a16:creationId xmlns:a16="http://schemas.microsoft.com/office/drawing/2014/main" xmlns="" id="{5D30DDF8-853A-DFDB-A947-FE9D44C8E03C}"/>
               </a:ext>
             </a:extLst>
           </p:cNvPr>
@@ -9870,7 +10736,7 @@
           <p:cNvPr id="3" name="Text Placeholder 2">
             <a:extLst>
               <a:ext uri="{FF2B5EF4-FFF2-40B4-BE49-F238E27FC236}">
-                <a16:creationId xmlns:a16="http://schemas.microsoft.com/office/drawing/2014/main" id="{F3FFBF10-3A6A-039D-96F3-6E61CA66CD1E}"/>
+                <a16:creationId xmlns:a16="http://schemas.microsoft.com/office/drawing/2014/main" xmlns="" id="{F3FFBF10-3A6A-039D-96F3-6E61CA66CD1E}"/>
               </a:ext>
             </a:extLst>
           </p:cNvPr>
@@ -9936,7 +10802,7 @@
           <p:cNvPr id="5" name="Picture 4">
             <a:extLst>
               <a:ext uri="{FF2B5EF4-FFF2-40B4-BE49-F238E27FC236}">
-                <a16:creationId xmlns:a16="http://schemas.microsoft.com/office/drawing/2014/main" id="{DF5E120D-8E2E-D414-9BE3-A68A099B210E}"/>
+                <a16:creationId xmlns:a16="http://schemas.microsoft.com/office/drawing/2014/main" xmlns="" id="{DF5E120D-8E2E-D414-9BE3-A68A099B210E}"/>
               </a:ext>
             </a:extLst>
           </p:cNvPr>
@@ -9971,7 +10837,7 @@
           <p:cNvPr id="7" name="Picture 6">
             <a:extLst>
               <a:ext uri="{FF2B5EF4-FFF2-40B4-BE49-F238E27FC236}">
-                <a16:creationId xmlns:a16="http://schemas.microsoft.com/office/drawing/2014/main" id="{5EC6C3A6-23EE-3547-4CDC-5D24A0A7D522}"/>
+                <a16:creationId xmlns:a16="http://schemas.microsoft.com/office/drawing/2014/main" xmlns="" id="{5EC6C3A6-23EE-3547-4CDC-5D24A0A7D522}"/>
               </a:ext>
             </a:extLst>
           </p:cNvPr>
@@ -10006,7 +10872,7 @@
           <p:cNvPr id="9" name="Picture 8">
             <a:extLst>
               <a:ext uri="{FF2B5EF4-FFF2-40B4-BE49-F238E27FC236}">
-                <a16:creationId xmlns:a16="http://schemas.microsoft.com/office/drawing/2014/main" id="{BCAA92A2-3C81-650B-7F86-D978F3483C08}"/>
+                <a16:creationId xmlns:a16="http://schemas.microsoft.com/office/drawing/2014/main" xmlns="" id="{BCAA92A2-3C81-650B-7F86-D978F3483C08}"/>
               </a:ext>
             </a:extLst>
           </p:cNvPr>
@@ -10041,7 +10907,7 @@
           <p:cNvPr id="13" name="Straight Arrow Connector 12">
             <a:extLst>
               <a:ext uri="{FF2B5EF4-FFF2-40B4-BE49-F238E27FC236}">
-                <a16:creationId xmlns:a16="http://schemas.microsoft.com/office/drawing/2014/main" id="{0CF5CAB6-3C22-9FEC-7E1E-7B91C8E5761F}"/>
+                <a16:creationId xmlns:a16="http://schemas.microsoft.com/office/drawing/2014/main" xmlns="" id="{0CF5CAB6-3C22-9FEC-7E1E-7B91C8E5761F}"/>
               </a:ext>
             </a:extLst>
           </p:cNvPr>
@@ -10085,7 +10951,7 @@
           <p:cNvPr id="14" name="Straight Arrow Connector 13">
             <a:extLst>
               <a:ext uri="{FF2B5EF4-FFF2-40B4-BE49-F238E27FC236}">
-                <a16:creationId xmlns:a16="http://schemas.microsoft.com/office/drawing/2014/main" id="{1CCF16B9-A09E-4470-2324-7D202860F263}"/>
+                <a16:creationId xmlns:a16="http://schemas.microsoft.com/office/drawing/2014/main" xmlns="" id="{1CCF16B9-A09E-4470-2324-7D202860F263}"/>
               </a:ext>
             </a:extLst>
           </p:cNvPr>
@@ -10132,7 +10998,7 @@
           <p:cNvPr id="4" name="Straight Arrow Connector 3">
             <a:extLst>
               <a:ext uri="{FF2B5EF4-FFF2-40B4-BE49-F238E27FC236}">
-                <a16:creationId xmlns:a16="http://schemas.microsoft.com/office/drawing/2014/main" id="{98ADD665-6FC6-CEB4-6D76-8C26111BF116}"/>
+                <a16:creationId xmlns:a16="http://schemas.microsoft.com/office/drawing/2014/main" xmlns="" id="{98ADD665-6FC6-CEB4-6D76-8C26111BF116}"/>
               </a:ext>
             </a:extLst>
           </p:cNvPr>
@@ -10176,7 +11042,7 @@
           <p:cNvPr id="6" name="Straight Arrow Connector 5">
             <a:extLst>
               <a:ext uri="{FF2B5EF4-FFF2-40B4-BE49-F238E27FC236}">
-                <a16:creationId xmlns:a16="http://schemas.microsoft.com/office/drawing/2014/main" id="{3C0F131E-E90A-3652-2E94-739BA4B3AD14}"/>
+                <a16:creationId xmlns:a16="http://schemas.microsoft.com/office/drawing/2014/main" xmlns="" id="{3C0F131E-E90A-3652-2E94-739BA4B3AD14}"/>
               </a:ext>
             </a:extLst>
           </p:cNvPr>
@@ -10220,7 +11086,7 @@
           <p:cNvPr id="8" name="Straight Arrow Connector 7">
             <a:extLst>
               <a:ext uri="{FF2B5EF4-FFF2-40B4-BE49-F238E27FC236}">
-                <a16:creationId xmlns:a16="http://schemas.microsoft.com/office/drawing/2014/main" id="{953C8946-F2DA-9D06-E8E1-65ED0C5F25D8}"/>
+                <a16:creationId xmlns:a16="http://schemas.microsoft.com/office/drawing/2014/main" xmlns="" id="{953C8946-F2DA-9D06-E8E1-65ED0C5F25D8}"/>
               </a:ext>
             </a:extLst>
           </p:cNvPr>
@@ -10267,7 +11133,7 @@
           <p:cNvPr id="10" name="Straight Arrow Connector 9">
             <a:extLst>
               <a:ext uri="{FF2B5EF4-FFF2-40B4-BE49-F238E27FC236}">
-                <a16:creationId xmlns:a16="http://schemas.microsoft.com/office/drawing/2014/main" id="{73A92731-B2F7-2195-B2DA-1A6401977BE5}"/>
+                <a16:creationId xmlns:a16="http://schemas.microsoft.com/office/drawing/2014/main" xmlns="" id="{73A92731-B2F7-2195-B2DA-1A6401977BE5}"/>
               </a:ext>
             </a:extLst>
           </p:cNvPr>
@@ -10314,7 +11180,7 @@
           <p:cNvPr id="11" name="TextBox 10">
             <a:extLst>
               <a:ext uri="{FF2B5EF4-FFF2-40B4-BE49-F238E27FC236}">
-                <a16:creationId xmlns:a16="http://schemas.microsoft.com/office/drawing/2014/main" id="{25E40C69-AAB7-773A-3E63-8815E4C667BB}"/>
+                <a16:creationId xmlns:a16="http://schemas.microsoft.com/office/drawing/2014/main" xmlns="" id="{25E40C69-AAB7-773A-3E63-8815E4C667BB}"/>
               </a:ext>
             </a:extLst>
           </p:cNvPr>
@@ -10355,7 +11221,7 @@
           <p:cNvPr id="12" name="TextBox 11">
             <a:extLst>
               <a:ext uri="{FF2B5EF4-FFF2-40B4-BE49-F238E27FC236}">
-                <a16:creationId xmlns:a16="http://schemas.microsoft.com/office/drawing/2014/main" id="{C2D554D5-ACAF-44BE-A0AE-5FAD5C39073F}"/>
+                <a16:creationId xmlns:a16="http://schemas.microsoft.com/office/drawing/2014/main" xmlns="" id="{C2D554D5-ACAF-44BE-A0AE-5FAD5C39073F}"/>
               </a:ext>
             </a:extLst>
           </p:cNvPr>
@@ -10396,7 +11262,7 @@
           <p:cNvPr id="16" name="Straight Connector 15">
             <a:extLst>
               <a:ext uri="{FF2B5EF4-FFF2-40B4-BE49-F238E27FC236}">
-                <a16:creationId xmlns:a16="http://schemas.microsoft.com/office/drawing/2014/main" id="{ACDAADC2-F7E7-2AB3-8431-833234F0D948}"/>
+                <a16:creationId xmlns:a16="http://schemas.microsoft.com/office/drawing/2014/main" xmlns="" id="{ACDAADC2-F7E7-2AB3-8431-833234F0D948}"/>
               </a:ext>
             </a:extLst>
           </p:cNvPr>
@@ -10439,7 +11305,7 @@
           <p:cNvPr id="19" name="Straight Connector 18">
             <a:extLst>
               <a:ext uri="{FF2B5EF4-FFF2-40B4-BE49-F238E27FC236}">
-                <a16:creationId xmlns:a16="http://schemas.microsoft.com/office/drawing/2014/main" id="{1D3114F2-3799-D088-0DA0-DE82349A782F}"/>
+                <a16:creationId xmlns:a16="http://schemas.microsoft.com/office/drawing/2014/main" xmlns="" id="{1D3114F2-3799-D088-0DA0-DE82349A782F}"/>
               </a:ext>
             </a:extLst>
           </p:cNvPr>
@@ -10482,7 +11348,7 @@
           <p:cNvPr id="22" name="TextBox 21">
             <a:extLst>
               <a:ext uri="{FF2B5EF4-FFF2-40B4-BE49-F238E27FC236}">
-                <a16:creationId xmlns:a16="http://schemas.microsoft.com/office/drawing/2014/main" id="{46B7EA58-223A-76DA-904C-B127A21679D7}"/>
+                <a16:creationId xmlns:a16="http://schemas.microsoft.com/office/drawing/2014/main" xmlns="" id="{46B7EA58-223A-76DA-904C-B127A21679D7}"/>
               </a:ext>
             </a:extLst>
           </p:cNvPr>
@@ -10553,7 +11419,7 @@
           <p:cNvPr id="2" name="TextBox 1">
             <a:extLst>
               <a:ext uri="{FF2B5EF4-FFF2-40B4-BE49-F238E27FC236}">
-                <a16:creationId xmlns:a16="http://schemas.microsoft.com/office/drawing/2014/main" id="{CFBB8880-030D-770F-78E0-250ED3C4086B}"/>
+                <a16:creationId xmlns:a16="http://schemas.microsoft.com/office/drawing/2014/main" xmlns="" id="{CFBB8880-030D-770F-78E0-250ED3C4086B}"/>
               </a:ext>
             </a:extLst>
           </p:cNvPr>
@@ -10592,7 +11458,7 @@
           <p:cNvPr id="4" name="Picture 3">
             <a:extLst>
               <a:ext uri="{FF2B5EF4-FFF2-40B4-BE49-F238E27FC236}">
-                <a16:creationId xmlns:a16="http://schemas.microsoft.com/office/drawing/2014/main" id="{FAAEB7AD-C825-8836-2CCC-6A519C365B2E}"/>
+                <a16:creationId xmlns:a16="http://schemas.microsoft.com/office/drawing/2014/main" xmlns="" id="{FAAEB7AD-C825-8836-2CCC-6A519C365B2E}"/>
               </a:ext>
             </a:extLst>
           </p:cNvPr>
@@ -10628,7 +11494,7 @@
           <p:cNvPr id="6" name="Picture 5">
             <a:extLst>
               <a:ext uri="{FF2B5EF4-FFF2-40B4-BE49-F238E27FC236}">
-                <a16:creationId xmlns:a16="http://schemas.microsoft.com/office/drawing/2014/main" id="{12FC48A8-7E76-3B37-EC98-7F8A0B19AB46}"/>
+                <a16:creationId xmlns:a16="http://schemas.microsoft.com/office/drawing/2014/main" xmlns="" id="{12FC48A8-7E76-3B37-EC98-7F8A0B19AB46}"/>
               </a:ext>
             </a:extLst>
           </p:cNvPr>
@@ -10664,7 +11530,7 @@
           <p:cNvPr id="7" name="TextBox 6">
             <a:extLst>
               <a:ext uri="{FF2B5EF4-FFF2-40B4-BE49-F238E27FC236}">
-                <a16:creationId xmlns:a16="http://schemas.microsoft.com/office/drawing/2014/main" id="{7A58E15A-2348-A7C6-FC81-48AD1D6E4181}"/>
+                <a16:creationId xmlns:a16="http://schemas.microsoft.com/office/drawing/2014/main" xmlns="" id="{7A58E15A-2348-A7C6-FC81-48AD1D6E4181}"/>
               </a:ext>
             </a:extLst>
           </p:cNvPr>
@@ -10699,7 +11565,7 @@
           <p:cNvPr id="8" name="Picture 7">
             <a:extLst>
               <a:ext uri="{FF2B5EF4-FFF2-40B4-BE49-F238E27FC236}">
-                <a16:creationId xmlns:a16="http://schemas.microsoft.com/office/drawing/2014/main" id="{C1B70BF2-C4A5-2826-E7C8-890B5910688F}"/>
+                <a16:creationId xmlns:a16="http://schemas.microsoft.com/office/drawing/2014/main" xmlns="" id="{C1B70BF2-C4A5-2826-E7C8-890B5910688F}"/>
               </a:ext>
             </a:extLst>
           </p:cNvPr>
@@ -10734,7 +11600,7 @@
           <p:cNvPr id="9" name="TextBox 8">
             <a:extLst>
               <a:ext uri="{FF2B5EF4-FFF2-40B4-BE49-F238E27FC236}">
-                <a16:creationId xmlns:a16="http://schemas.microsoft.com/office/drawing/2014/main" id="{F327D58F-429A-36B6-C4D6-D4B3D7248B24}"/>
+                <a16:creationId xmlns:a16="http://schemas.microsoft.com/office/drawing/2014/main" xmlns="" id="{F327D58F-429A-36B6-C4D6-D4B3D7248B24}"/>
               </a:ext>
             </a:extLst>
           </p:cNvPr>
@@ -10799,7 +11665,7 @@
           <p:cNvPr id="2" name="TextBox 1">
             <a:extLst>
               <a:ext uri="{FF2B5EF4-FFF2-40B4-BE49-F238E27FC236}">
-                <a16:creationId xmlns:a16="http://schemas.microsoft.com/office/drawing/2014/main" id="{CFBB8880-030D-770F-78E0-250ED3C4086B}"/>
+                <a16:creationId xmlns:a16="http://schemas.microsoft.com/office/drawing/2014/main" xmlns="" id="{CFBB8880-030D-770F-78E0-250ED3C4086B}"/>
               </a:ext>
             </a:extLst>
           </p:cNvPr>
@@ -10838,7 +11704,7 @@
           <p:cNvPr id="4" name="Picture 3">
             <a:extLst>
               <a:ext uri="{FF2B5EF4-FFF2-40B4-BE49-F238E27FC236}">
-                <a16:creationId xmlns:a16="http://schemas.microsoft.com/office/drawing/2014/main" id="{FAAEB7AD-C825-8836-2CCC-6A519C365B2E}"/>
+                <a16:creationId xmlns:a16="http://schemas.microsoft.com/office/drawing/2014/main" xmlns="" id="{FAAEB7AD-C825-8836-2CCC-6A519C365B2E}"/>
               </a:ext>
             </a:extLst>
           </p:cNvPr>
@@ -10874,7 +11740,7 @@
           <p:cNvPr id="3" name="TextBox 2">
             <a:extLst>
               <a:ext uri="{FF2B5EF4-FFF2-40B4-BE49-F238E27FC236}">
-                <a16:creationId xmlns:a16="http://schemas.microsoft.com/office/drawing/2014/main" id="{C3BFC904-2C98-0A6B-DB9F-F77D7062E30B}"/>
+                <a16:creationId xmlns:a16="http://schemas.microsoft.com/office/drawing/2014/main" xmlns="" id="{C3BFC904-2C98-0A6B-DB9F-F77D7062E30B}"/>
               </a:ext>
             </a:extLst>
           </p:cNvPr>
@@ -10909,7 +11775,7 @@
           <p:cNvPr id="10" name="Picture 9">
             <a:extLst>
               <a:ext uri="{FF2B5EF4-FFF2-40B4-BE49-F238E27FC236}">
-                <a16:creationId xmlns:a16="http://schemas.microsoft.com/office/drawing/2014/main" id="{479D0D63-8B89-D61F-B6AC-12A0A9B1880F}"/>
+                <a16:creationId xmlns:a16="http://schemas.microsoft.com/office/drawing/2014/main" xmlns="" id="{479D0D63-8B89-D61F-B6AC-12A0A9B1880F}"/>
               </a:ext>
             </a:extLst>
           </p:cNvPr>
@@ -10944,7 +11810,7 @@
           <p:cNvPr id="11" name="TextBox 10">
             <a:extLst>
               <a:ext uri="{FF2B5EF4-FFF2-40B4-BE49-F238E27FC236}">
-                <a16:creationId xmlns:a16="http://schemas.microsoft.com/office/drawing/2014/main" id="{3EE8954A-E471-F2EF-426C-D988AF32186F}"/>
+                <a16:creationId xmlns:a16="http://schemas.microsoft.com/office/drawing/2014/main" xmlns="" id="{3EE8954A-E471-F2EF-426C-D988AF32186F}"/>
               </a:ext>
             </a:extLst>
           </p:cNvPr>
@@ -11009,7 +11875,7 @@
           <p:cNvPr id="2" name="TextBox 1">
             <a:extLst>
               <a:ext uri="{FF2B5EF4-FFF2-40B4-BE49-F238E27FC236}">
-                <a16:creationId xmlns:a16="http://schemas.microsoft.com/office/drawing/2014/main" id="{58458917-3328-445C-86E8-B4D8A6CBAF47}"/>
+                <a16:creationId xmlns:a16="http://schemas.microsoft.com/office/drawing/2014/main" xmlns="" id="{58458917-3328-445C-86E8-B4D8A6CBAF47}"/>
               </a:ext>
             </a:extLst>
           </p:cNvPr>
@@ -11044,7 +11910,7 @@
           <p:cNvPr id="4" name="TextBox 3">
             <a:extLst>
               <a:ext uri="{FF2B5EF4-FFF2-40B4-BE49-F238E27FC236}">
-                <a16:creationId xmlns:a16="http://schemas.microsoft.com/office/drawing/2014/main" id="{59C408C2-F21E-4C19-8E48-FFB355E98CF4}"/>
+                <a16:creationId xmlns:a16="http://schemas.microsoft.com/office/drawing/2014/main" xmlns="" id="{59C408C2-F21E-4C19-8E48-FFB355E98CF4}"/>
               </a:ext>
             </a:extLst>
           </p:cNvPr>
@@ -11085,7 +11951,7 @@
           <p:cNvPr id="24" name="Picture 23">
             <a:extLst>
               <a:ext uri="{FF2B5EF4-FFF2-40B4-BE49-F238E27FC236}">
-                <a16:creationId xmlns:a16="http://schemas.microsoft.com/office/drawing/2014/main" id="{7601F9BB-3928-4495-B86A-5B5A12CCEAB1}"/>
+                <a16:creationId xmlns:a16="http://schemas.microsoft.com/office/drawing/2014/main" xmlns="" id="{7601F9BB-3928-4495-B86A-5B5A12CCEAB1}"/>
               </a:ext>
             </a:extLst>
           </p:cNvPr>
@@ -11121,7 +11987,7 @@
           <p:cNvPr id="25" name="TextBox 24">
             <a:extLst>
               <a:ext uri="{FF2B5EF4-FFF2-40B4-BE49-F238E27FC236}">
-                <a16:creationId xmlns:a16="http://schemas.microsoft.com/office/drawing/2014/main" id="{76B2A961-23A7-46AF-9437-D9BEDD34FE3E}"/>
+                <a16:creationId xmlns:a16="http://schemas.microsoft.com/office/drawing/2014/main" xmlns="" id="{76B2A961-23A7-46AF-9437-D9BEDD34FE3E}"/>
               </a:ext>
             </a:extLst>
           </p:cNvPr>
@@ -11216,7 +12082,7 @@
           <p:cNvPr id="2" name="TextBox 1">
             <a:extLst>
               <a:ext uri="{FF2B5EF4-FFF2-40B4-BE49-F238E27FC236}">
-                <a16:creationId xmlns:a16="http://schemas.microsoft.com/office/drawing/2014/main" id="{A694A103-367C-4EBF-A279-F53737AF5323}"/>
+                <a16:creationId xmlns:a16="http://schemas.microsoft.com/office/drawing/2014/main" xmlns="" id="{A694A103-367C-4EBF-A279-F53737AF5323}"/>
               </a:ext>
             </a:extLst>
           </p:cNvPr>
@@ -11252,7 +12118,7 @@
           <p:cNvPr id="4" name="TextBox 3">
             <a:extLst>
               <a:ext uri="{FF2B5EF4-FFF2-40B4-BE49-F238E27FC236}">
-                <a16:creationId xmlns:a16="http://schemas.microsoft.com/office/drawing/2014/main" id="{8E41D626-2890-4F5E-986E-D62832054533}"/>
+                <a16:creationId xmlns:a16="http://schemas.microsoft.com/office/drawing/2014/main" xmlns="" id="{8E41D626-2890-4F5E-986E-D62832054533}"/>
               </a:ext>
             </a:extLst>
           </p:cNvPr>
@@ -11293,7 +12159,7 @@
           <p:cNvPr id="6" name="Picture 5">
             <a:extLst>
               <a:ext uri="{FF2B5EF4-FFF2-40B4-BE49-F238E27FC236}">
-                <a16:creationId xmlns:a16="http://schemas.microsoft.com/office/drawing/2014/main" id="{BB4F0E99-6A1D-4C17-B926-AF7D414F4769}"/>
+                <a16:creationId xmlns:a16="http://schemas.microsoft.com/office/drawing/2014/main" xmlns="" id="{BB4F0E99-6A1D-4C17-B926-AF7D414F4769}"/>
               </a:ext>
             </a:extLst>
           </p:cNvPr>
@@ -11329,7 +12195,7 @@
           <p:cNvPr id="7" name="TextBox 6">
             <a:extLst>
               <a:ext uri="{FF2B5EF4-FFF2-40B4-BE49-F238E27FC236}">
-                <a16:creationId xmlns:a16="http://schemas.microsoft.com/office/drawing/2014/main" id="{BD591925-B68E-4F15-A165-E73B5EC33074}"/>
+                <a16:creationId xmlns:a16="http://schemas.microsoft.com/office/drawing/2014/main" xmlns="" id="{BD591925-B68E-4F15-A165-E73B5EC33074}"/>
               </a:ext>
             </a:extLst>
           </p:cNvPr>
@@ -11379,7 +12245,7 @@
           <p:cNvPr id="11" name="Picture 10">
             <a:extLst>
               <a:ext uri="{FF2B5EF4-FFF2-40B4-BE49-F238E27FC236}">
-                <a16:creationId xmlns:a16="http://schemas.microsoft.com/office/drawing/2014/main" id="{0532259E-1BD2-4B1E-AFFB-6294D0EFCE91}"/>
+                <a16:creationId xmlns:a16="http://schemas.microsoft.com/office/drawing/2014/main" xmlns="" id="{0532259E-1BD2-4B1E-AFFB-6294D0EFCE91}"/>
               </a:ext>
             </a:extLst>
           </p:cNvPr>
@@ -11445,7 +12311,7 @@
           <p:cNvPr id="3" name="TextBox 2">
             <a:extLst>
               <a:ext uri="{FF2B5EF4-FFF2-40B4-BE49-F238E27FC236}">
-                <a16:creationId xmlns:a16="http://schemas.microsoft.com/office/drawing/2014/main" id="{6129BCCE-EAA2-06B8-2ABB-36E1965B0FED}"/>
+                <a16:creationId xmlns:a16="http://schemas.microsoft.com/office/drawing/2014/main" xmlns="" id="{6129BCCE-EAA2-06B8-2ABB-36E1965B0FED}"/>
               </a:ext>
             </a:extLst>
           </p:cNvPr>
@@ -11492,7 +12358,7 @@
           <p:cNvPr id="2" name="TextBox 1">
             <a:extLst>
               <a:ext uri="{FF2B5EF4-FFF2-40B4-BE49-F238E27FC236}">
-                <a16:creationId xmlns:a16="http://schemas.microsoft.com/office/drawing/2014/main" id="{4073108B-FF80-2542-E514-618C5A826695}"/>
+                <a16:creationId xmlns:a16="http://schemas.microsoft.com/office/drawing/2014/main" xmlns="" id="{4073108B-FF80-2542-E514-618C5A826695}"/>
               </a:ext>
             </a:extLst>
           </p:cNvPr>
@@ -11923,7 +12789,7 @@
   <a:extraClrSchemeLst/>
   <a:extLst>
     <a:ext uri="{05A4C25C-085E-4340-85A3-A5531E510DB2}">
-      <thm15:themeFamily xmlns:thm15="http://schemas.microsoft.com/office/thememl/2012/main" name="Office Theme" id="{62F939B6-93AF-4DB8-9C6B-D6C7DFDC589F}" vid="{4A3C46E8-61CC-4603-A589-7422A47A8E4A}"/>
+      <thm15:themeFamily xmlns:thm15="http://schemas.microsoft.com/office/thememl/2012/main" xmlns="" name="Office Theme" id="{62F939B6-93AF-4DB8-9C6B-D6C7DFDC589F}" vid="{4A3C46E8-61CC-4603-A589-7422A47A8E4A}"/>
     </a:ext>
   </a:extLst>
 </a:theme>
@@ -12218,7 +13084,7 @@
   <a:extraClrSchemeLst/>
   <a:extLst>
     <a:ext uri="{05A4C25C-085E-4340-85A3-A5531E510DB2}">
-      <thm15:themeFamily xmlns:thm15="http://schemas.microsoft.com/office/thememl/2012/main" name="Office Theme" id="{62F939B6-93AF-4DB8-9C6B-D6C7DFDC589F}" vid="{4A3C46E8-61CC-4603-A589-7422A47A8E4A}"/>
+      <thm15:themeFamily xmlns:thm15="http://schemas.microsoft.com/office/thememl/2012/main" xmlns="" name="Office Theme" id="{62F939B6-93AF-4DB8-9C6B-D6C7DFDC589F}" vid="{4A3C46E8-61CC-4603-A589-7422A47A8E4A}"/>
     </a:ext>
   </a:extLst>
 </a:theme>

</xml_diff>